<commit_message>
astrated wokrin on ion beam figure
</commit_message>
<xml_diff>
--- a/figures/ionBeam.pptx
+++ b/figures/ionBeam.pptx
@@ -5,12 +5,13 @@
     <p:sldMasterId id="2147483648" r:id="rId1"/>
   </p:sldMasterIdLst>
   <p:notesMasterIdLst>
-    <p:notesMasterId r:id="rId5"/>
+    <p:notesMasterId r:id="rId6"/>
   </p:notesMasterIdLst>
   <p:sldIdLst>
     <p:sldId id="257" r:id="rId2"/>
     <p:sldId id="258" r:id="rId3"/>
     <p:sldId id="259" r:id="rId4"/>
+    <p:sldId id="260" r:id="rId5"/>
   </p:sldIdLst>
   <p:sldSz cx="9144000" cy="6858000" type="screen4x3"/>
   <p:notesSz cx="6858000" cy="9144000"/>
@@ -11585,6 +11586,1602 @@
     <p:extLst>
       <p:ext uri="{BB962C8B-B14F-4D97-AF65-F5344CB8AC3E}">
         <p14:creationId xmlns:p14="http://schemas.microsoft.com/office/powerpoint/2010/main" val="3807057477"/>
+      </p:ext>
+    </p:extLst>
+  </p:cSld>
+  <p:clrMapOvr>
+    <a:masterClrMapping/>
+  </p:clrMapOvr>
+  <p:timing>
+    <p:tnLst>
+      <p:par>
+        <p:cTn id="1" dur="indefinite" restart="never" nodeType="tmRoot"/>
+      </p:par>
+    </p:tnLst>
+  </p:timing>
+</p:sld>
+</file>
+
+<file path=ppt/slides/slide4.xml><?xml version="1.0" encoding="utf-8"?>
+<p:sld xmlns:a="http://schemas.openxmlformats.org/drawingml/2006/main" xmlns:r="http://schemas.openxmlformats.org/officeDocument/2006/relationships" xmlns:p="http://schemas.openxmlformats.org/presentationml/2006/main">
+  <p:cSld>
+    <p:spTree>
+      <p:nvGrpSpPr>
+        <p:cNvPr id="1" name=""/>
+        <p:cNvGrpSpPr/>
+        <p:nvPr/>
+      </p:nvGrpSpPr>
+      <p:grpSpPr>
+        <a:xfrm>
+          <a:off x="0" y="0"/>
+          <a:ext cx="0" cy="0"/>
+          <a:chOff x="0" y="0"/>
+          <a:chExt cx="0" cy="0"/>
+        </a:xfrm>
+      </p:grpSpPr>
+      <p:sp>
+        <p:nvSpPr>
+          <p:cNvPr id="9" name="Freeform 8"/>
+          <p:cNvSpPr/>
+          <p:nvPr/>
+        </p:nvSpPr>
+        <p:spPr>
+          <a:xfrm>
+            <a:off x="4835640" y="1182499"/>
+            <a:ext cx="4119156" cy="2750448"/>
+          </a:xfrm>
+          <a:custGeom>
+            <a:avLst/>
+            <a:gdLst>
+              <a:gd name="connsiteX0" fmla="*/ 0 w 2751909"/>
+              <a:gd name="connsiteY0" fmla="*/ 696685 h 1837508"/>
+              <a:gd name="connsiteX1" fmla="*/ 461554 w 2751909"/>
+              <a:gd name="connsiteY1" fmla="*/ 696685 h 1837508"/>
+              <a:gd name="connsiteX2" fmla="*/ 731520 w 2751909"/>
+              <a:gd name="connsiteY2" fmla="*/ 0 h 1837508"/>
+              <a:gd name="connsiteX3" fmla="*/ 2751909 w 2751909"/>
+              <a:gd name="connsiteY3" fmla="*/ 0 h 1837508"/>
+              <a:gd name="connsiteX4" fmla="*/ 2751909 w 2751909"/>
+              <a:gd name="connsiteY4" fmla="*/ 1837508 h 1837508"/>
+              <a:gd name="connsiteX5" fmla="*/ 792480 w 2751909"/>
+              <a:gd name="connsiteY5" fmla="*/ 1837508 h 1837508"/>
+              <a:gd name="connsiteX6" fmla="*/ 452846 w 2751909"/>
+              <a:gd name="connsiteY6" fmla="*/ 1123405 h 1837508"/>
+              <a:gd name="connsiteX7" fmla="*/ 8709 w 2751909"/>
+              <a:gd name="connsiteY7" fmla="*/ 1123405 h 1837508"/>
+              <a:gd name="connsiteX8" fmla="*/ 0 w 2751909"/>
+              <a:gd name="connsiteY8" fmla="*/ 696685 h 1837508"/>
+            </a:gdLst>
+            <a:ahLst/>
+            <a:cxnLst>
+              <a:cxn ang="0">
+                <a:pos x="connsiteX0" y="connsiteY0"/>
+              </a:cxn>
+              <a:cxn ang="0">
+                <a:pos x="connsiteX1" y="connsiteY1"/>
+              </a:cxn>
+              <a:cxn ang="0">
+                <a:pos x="connsiteX2" y="connsiteY2"/>
+              </a:cxn>
+              <a:cxn ang="0">
+                <a:pos x="connsiteX3" y="connsiteY3"/>
+              </a:cxn>
+              <a:cxn ang="0">
+                <a:pos x="connsiteX4" y="connsiteY4"/>
+              </a:cxn>
+              <a:cxn ang="0">
+                <a:pos x="connsiteX5" y="connsiteY5"/>
+              </a:cxn>
+              <a:cxn ang="0">
+                <a:pos x="connsiteX6" y="connsiteY6"/>
+              </a:cxn>
+              <a:cxn ang="0">
+                <a:pos x="connsiteX7" y="connsiteY7"/>
+              </a:cxn>
+              <a:cxn ang="0">
+                <a:pos x="connsiteX8" y="connsiteY8"/>
+              </a:cxn>
+            </a:cxnLst>
+            <a:rect l="l" t="t" r="r" b="b"/>
+            <a:pathLst>
+              <a:path w="2751909" h="1837508">
+                <a:moveTo>
+                  <a:pt x="0" y="696685"/>
+                </a:moveTo>
+                <a:lnTo>
+                  <a:pt x="461554" y="696685"/>
+                </a:lnTo>
+                <a:lnTo>
+                  <a:pt x="731520" y="0"/>
+                </a:lnTo>
+                <a:lnTo>
+                  <a:pt x="2751909" y="0"/>
+                </a:lnTo>
+                <a:lnTo>
+                  <a:pt x="2751909" y="1837508"/>
+                </a:lnTo>
+                <a:lnTo>
+                  <a:pt x="792480" y="1837508"/>
+                </a:lnTo>
+                <a:lnTo>
+                  <a:pt x="452846" y="1123405"/>
+                </a:lnTo>
+                <a:lnTo>
+                  <a:pt x="8709" y="1123405"/>
+                </a:lnTo>
+                <a:lnTo>
+                  <a:pt x="0" y="696685"/>
+                </a:lnTo>
+                <a:close/>
+              </a:path>
+            </a:pathLst>
+          </a:custGeom>
+          <a:noFill/>
+          <a:ln w="76200">
+            <a:solidFill>
+              <a:schemeClr val="bg1">
+                <a:lumMod val="65000"/>
+              </a:schemeClr>
+            </a:solidFill>
+          </a:ln>
+        </p:spPr>
+        <p:style>
+          <a:lnRef idx="2">
+            <a:schemeClr val="accent1">
+              <a:shade val="50000"/>
+            </a:schemeClr>
+          </a:lnRef>
+          <a:fillRef idx="1">
+            <a:schemeClr val="accent1"/>
+          </a:fillRef>
+          <a:effectRef idx="0">
+            <a:schemeClr val="accent1"/>
+          </a:effectRef>
+          <a:fontRef idx="minor">
+            <a:schemeClr val="lt1"/>
+          </a:fontRef>
+        </p:style>
+        <p:txBody>
+          <a:bodyPr rtlCol="0" anchor="ctr"/>
+          <a:lstStyle/>
+          <a:p>
+            <a:pPr algn="ctr"/>
+            <a:endParaRPr lang="en-US"/>
+          </a:p>
+        </p:txBody>
+      </p:sp>
+      <p:sp>
+        <p:nvSpPr>
+          <p:cNvPr id="59" name="Rectangle 58"/>
+          <p:cNvSpPr/>
+          <p:nvPr/>
+        </p:nvSpPr>
+        <p:spPr>
+          <a:xfrm>
+            <a:off x="8669383" y="1023570"/>
+            <a:ext cx="381000" cy="3074125"/>
+          </a:xfrm>
+          <a:prstGeom prst="rect">
+            <a:avLst/>
+          </a:prstGeom>
+          <a:solidFill>
+            <a:schemeClr val="bg1"/>
+          </a:solidFill>
+          <a:ln>
+            <a:solidFill>
+              <a:schemeClr val="bg1"/>
+            </a:solidFill>
+          </a:ln>
+        </p:spPr>
+        <p:style>
+          <a:lnRef idx="2">
+            <a:schemeClr val="accent1">
+              <a:shade val="50000"/>
+            </a:schemeClr>
+          </a:lnRef>
+          <a:fillRef idx="1">
+            <a:schemeClr val="accent1"/>
+          </a:fillRef>
+          <a:effectRef idx="0">
+            <a:schemeClr val="accent1"/>
+          </a:effectRef>
+          <a:fontRef idx="minor">
+            <a:schemeClr val="lt1"/>
+          </a:fontRef>
+        </p:style>
+        <p:txBody>
+          <a:bodyPr rtlCol="0" anchor="ctr"/>
+          <a:lstStyle/>
+          <a:p>
+            <a:pPr algn="ctr"/>
+            <a:endParaRPr lang="en-US"/>
+          </a:p>
+        </p:txBody>
+      </p:sp>
+      <p:sp>
+        <p:nvSpPr>
+          <p:cNvPr id="2" name="Slide Number Placeholder 1"/>
+          <p:cNvSpPr>
+            <a:spLocks noGrp="1"/>
+          </p:cNvSpPr>
+          <p:nvPr>
+            <p:ph type="sldNum" sz="quarter" idx="12"/>
+          </p:nvPr>
+        </p:nvSpPr>
+        <p:spPr>
+          <a:xfrm>
+            <a:off x="7010400" y="6492877"/>
+            <a:ext cx="2133600" cy="365125"/>
+          </a:xfrm>
+        </p:spPr>
+        <p:txBody>
+          <a:bodyPr/>
+          <a:lstStyle/>
+          <a:p>
+            <a:fld id="{66B1EE22-C4C2-482C-B3A9-AFE3A9744799}" type="slidenum">
+              <a:rPr lang="en-US" smtClean="0"/>
+              <a:t>4</a:t>
+            </a:fld>
+            <a:endParaRPr lang="en-US"/>
+          </a:p>
+        </p:txBody>
+      </p:sp>
+      <p:cxnSp>
+        <p:nvCxnSpPr>
+          <p:cNvPr id="15" name="Straight Connector 14"/>
+          <p:cNvCxnSpPr/>
+          <p:nvPr/>
+        </p:nvCxnSpPr>
+        <p:spPr>
+          <a:xfrm>
+            <a:off x="5037437" y="1715899"/>
+            <a:ext cx="3058476" cy="0"/>
+          </a:xfrm>
+          <a:prstGeom prst="line">
+            <a:avLst/>
+          </a:prstGeom>
+          <a:ln w="38100">
+            <a:solidFill>
+              <a:schemeClr val="tx1">
+                <a:lumMod val="75000"/>
+                <a:lumOff val="25000"/>
+              </a:schemeClr>
+            </a:solidFill>
+          </a:ln>
+        </p:spPr>
+        <p:style>
+          <a:lnRef idx="1">
+            <a:schemeClr val="accent1"/>
+          </a:lnRef>
+          <a:fillRef idx="0">
+            <a:schemeClr val="accent1"/>
+          </a:fillRef>
+          <a:effectRef idx="0">
+            <a:schemeClr val="accent1"/>
+          </a:effectRef>
+          <a:fontRef idx="minor">
+            <a:schemeClr val="tx1"/>
+          </a:fontRef>
+        </p:style>
+      </p:cxnSp>
+      <p:cxnSp>
+        <p:nvCxnSpPr>
+          <p:cNvPr id="18" name="Straight Connector 17"/>
+          <p:cNvCxnSpPr/>
+          <p:nvPr/>
+        </p:nvCxnSpPr>
+        <p:spPr>
+          <a:xfrm flipV="1">
+            <a:off x="8157964" y="1773593"/>
+            <a:ext cx="0" cy="609600"/>
+          </a:xfrm>
+          <a:prstGeom prst="line">
+            <a:avLst/>
+          </a:prstGeom>
+          <a:ln w="38100">
+            <a:solidFill>
+              <a:schemeClr val="tx1">
+                <a:lumMod val="75000"/>
+                <a:lumOff val="25000"/>
+              </a:schemeClr>
+            </a:solidFill>
+          </a:ln>
+        </p:spPr>
+        <p:style>
+          <a:lnRef idx="1">
+            <a:schemeClr val="accent1"/>
+          </a:lnRef>
+          <a:fillRef idx="0">
+            <a:schemeClr val="accent1"/>
+          </a:fillRef>
+          <a:effectRef idx="0">
+            <a:schemeClr val="accent1"/>
+          </a:effectRef>
+          <a:fontRef idx="minor">
+            <a:schemeClr val="tx1"/>
+          </a:fontRef>
+        </p:style>
+      </p:cxnSp>
+      <p:cxnSp>
+        <p:nvCxnSpPr>
+          <p:cNvPr id="21" name="Straight Connector 20"/>
+          <p:cNvCxnSpPr/>
+          <p:nvPr/>
+        </p:nvCxnSpPr>
+        <p:spPr>
+          <a:xfrm flipH="1">
+            <a:off x="7874050" y="2501597"/>
+            <a:ext cx="189413" cy="0"/>
+          </a:xfrm>
+          <a:prstGeom prst="line">
+            <a:avLst/>
+          </a:prstGeom>
+          <a:ln w="38100">
+            <a:solidFill>
+              <a:schemeClr val="tx1">
+                <a:lumMod val="75000"/>
+                <a:lumOff val="25000"/>
+              </a:schemeClr>
+            </a:solidFill>
+          </a:ln>
+        </p:spPr>
+        <p:style>
+          <a:lnRef idx="1">
+            <a:schemeClr val="accent1"/>
+          </a:lnRef>
+          <a:fillRef idx="0">
+            <a:schemeClr val="accent1"/>
+          </a:fillRef>
+          <a:effectRef idx="0">
+            <a:schemeClr val="accent1"/>
+          </a:effectRef>
+          <a:fontRef idx="minor">
+            <a:schemeClr val="tx1"/>
+          </a:fontRef>
+        </p:style>
+      </p:cxnSp>
+      <p:cxnSp>
+        <p:nvCxnSpPr>
+          <p:cNvPr id="23" name="Straight Connector 22"/>
+          <p:cNvCxnSpPr/>
+          <p:nvPr/>
+        </p:nvCxnSpPr>
+        <p:spPr>
+          <a:xfrm flipH="1" flipV="1">
+            <a:off x="7795673" y="2001106"/>
+            <a:ext cx="78377" cy="500491"/>
+          </a:xfrm>
+          <a:prstGeom prst="line">
+            <a:avLst/>
+          </a:prstGeom>
+          <a:ln w="38100">
+            <a:solidFill>
+              <a:schemeClr val="tx1">
+                <a:lumMod val="75000"/>
+                <a:lumOff val="25000"/>
+              </a:schemeClr>
+            </a:solidFill>
+          </a:ln>
+        </p:spPr>
+        <p:style>
+          <a:lnRef idx="1">
+            <a:schemeClr val="accent1"/>
+          </a:lnRef>
+          <a:fillRef idx="0">
+            <a:schemeClr val="accent1"/>
+          </a:fillRef>
+          <a:effectRef idx="0">
+            <a:schemeClr val="accent1"/>
+          </a:effectRef>
+          <a:fontRef idx="minor">
+            <a:schemeClr val="tx1"/>
+          </a:fontRef>
+        </p:style>
+      </p:cxnSp>
+      <p:cxnSp>
+        <p:nvCxnSpPr>
+          <p:cNvPr id="25" name="Straight Connector 24"/>
+          <p:cNvCxnSpPr/>
+          <p:nvPr/>
+        </p:nvCxnSpPr>
+        <p:spPr>
+          <a:xfrm flipH="1">
+            <a:off x="7638712" y="1995664"/>
+            <a:ext cx="151312" cy="1168037"/>
+          </a:xfrm>
+          <a:prstGeom prst="line">
+            <a:avLst/>
+          </a:prstGeom>
+          <a:ln w="38100">
+            <a:solidFill>
+              <a:schemeClr val="tx1">
+                <a:lumMod val="75000"/>
+                <a:lumOff val="25000"/>
+              </a:schemeClr>
+            </a:solidFill>
+          </a:ln>
+        </p:spPr>
+        <p:style>
+          <a:lnRef idx="1">
+            <a:schemeClr val="accent1"/>
+          </a:lnRef>
+          <a:fillRef idx="0">
+            <a:schemeClr val="accent1"/>
+          </a:fillRef>
+          <a:effectRef idx="0">
+            <a:schemeClr val="accent1"/>
+          </a:effectRef>
+          <a:fontRef idx="minor">
+            <a:schemeClr val="tx1"/>
+          </a:fontRef>
+        </p:style>
+      </p:cxnSp>
+      <p:cxnSp>
+        <p:nvCxnSpPr>
+          <p:cNvPr id="27" name="Straight Connector 26"/>
+          <p:cNvCxnSpPr/>
+          <p:nvPr/>
+        </p:nvCxnSpPr>
+        <p:spPr>
+          <a:xfrm>
+            <a:off x="7485224" y="1995664"/>
+            <a:ext cx="153489" cy="1165315"/>
+          </a:xfrm>
+          <a:prstGeom prst="line">
+            <a:avLst/>
+          </a:prstGeom>
+          <a:ln w="38100">
+            <a:solidFill>
+              <a:schemeClr val="tx1">
+                <a:lumMod val="75000"/>
+                <a:lumOff val="25000"/>
+              </a:schemeClr>
+            </a:solidFill>
+          </a:ln>
+        </p:spPr>
+        <p:style>
+          <a:lnRef idx="1">
+            <a:schemeClr val="accent1"/>
+          </a:lnRef>
+          <a:fillRef idx="0">
+            <a:schemeClr val="accent1"/>
+          </a:fillRef>
+          <a:effectRef idx="0">
+            <a:schemeClr val="accent1"/>
+          </a:effectRef>
+          <a:fontRef idx="minor">
+            <a:schemeClr val="tx1"/>
+          </a:fontRef>
+        </p:style>
+      </p:cxnSp>
+      <p:cxnSp>
+        <p:nvCxnSpPr>
+          <p:cNvPr id="36" name="Straight Connector 35"/>
+          <p:cNvCxnSpPr/>
+          <p:nvPr/>
+        </p:nvCxnSpPr>
+        <p:spPr>
+          <a:xfrm flipH="1">
+            <a:off x="5053765" y="3392299"/>
+            <a:ext cx="1361598" cy="0"/>
+          </a:xfrm>
+          <a:prstGeom prst="line">
+            <a:avLst/>
+          </a:prstGeom>
+          <a:ln w="38100">
+            <a:solidFill>
+              <a:schemeClr val="tx1">
+                <a:lumMod val="75000"/>
+                <a:lumOff val="25000"/>
+              </a:schemeClr>
+            </a:solidFill>
+          </a:ln>
+        </p:spPr>
+        <p:style>
+          <a:lnRef idx="1">
+            <a:schemeClr val="accent1"/>
+          </a:lnRef>
+          <a:fillRef idx="0">
+            <a:schemeClr val="accent1"/>
+          </a:fillRef>
+          <a:effectRef idx="0">
+            <a:schemeClr val="accent1"/>
+          </a:effectRef>
+          <a:fontRef idx="minor">
+            <a:schemeClr val="tx1"/>
+          </a:fontRef>
+        </p:style>
+      </p:cxnSp>
+      <p:cxnSp>
+        <p:nvCxnSpPr>
+          <p:cNvPr id="37" name="Straight Connector 36"/>
+          <p:cNvCxnSpPr/>
+          <p:nvPr/>
+        </p:nvCxnSpPr>
+        <p:spPr>
+          <a:xfrm flipV="1">
+            <a:off x="6415363" y="3177577"/>
+            <a:ext cx="0" cy="214722"/>
+          </a:xfrm>
+          <a:prstGeom prst="line">
+            <a:avLst/>
+          </a:prstGeom>
+          <a:ln w="38100">
+            <a:solidFill>
+              <a:schemeClr val="tx1">
+                <a:lumMod val="75000"/>
+                <a:lumOff val="25000"/>
+              </a:schemeClr>
+            </a:solidFill>
+          </a:ln>
+        </p:spPr>
+        <p:style>
+          <a:lnRef idx="1">
+            <a:schemeClr val="accent1"/>
+          </a:lnRef>
+          <a:fillRef idx="0">
+            <a:schemeClr val="accent1"/>
+          </a:fillRef>
+          <a:effectRef idx="0">
+            <a:schemeClr val="accent1"/>
+          </a:effectRef>
+          <a:fontRef idx="minor">
+            <a:schemeClr val="tx1"/>
+          </a:fontRef>
+        </p:style>
+      </p:cxnSp>
+      <p:sp>
+        <p:nvSpPr>
+          <p:cNvPr id="41" name="Arc 40"/>
+          <p:cNvSpPr/>
+          <p:nvPr/>
+        </p:nvSpPr>
+        <p:spPr>
+          <a:xfrm>
+            <a:off x="8001208" y="1715901"/>
+            <a:ext cx="156756" cy="134035"/>
+          </a:xfrm>
+          <a:prstGeom prst="arc">
+            <a:avLst/>
+          </a:prstGeom>
+          <a:ln w="38100">
+            <a:solidFill>
+              <a:schemeClr val="tx1">
+                <a:lumMod val="75000"/>
+                <a:lumOff val="25000"/>
+              </a:schemeClr>
+            </a:solidFill>
+          </a:ln>
+        </p:spPr>
+        <p:style>
+          <a:lnRef idx="1">
+            <a:schemeClr val="accent1"/>
+          </a:lnRef>
+          <a:fillRef idx="0">
+            <a:schemeClr val="accent1"/>
+          </a:fillRef>
+          <a:effectRef idx="0">
+            <a:schemeClr val="accent1"/>
+          </a:effectRef>
+          <a:fontRef idx="minor">
+            <a:schemeClr val="tx1"/>
+          </a:fontRef>
+        </p:style>
+        <p:txBody>
+          <a:bodyPr rtlCol="0" anchor="ctr"/>
+          <a:lstStyle/>
+          <a:p>
+            <a:pPr algn="ctr"/>
+            <a:endParaRPr lang="en-US"/>
+          </a:p>
+        </p:txBody>
+      </p:sp>
+      <p:sp>
+        <p:nvSpPr>
+          <p:cNvPr id="42" name="Arc 41"/>
+          <p:cNvSpPr/>
+          <p:nvPr/>
+        </p:nvSpPr>
+        <p:spPr>
+          <a:xfrm rot="5077074">
+            <a:off x="7925008" y="2268893"/>
+            <a:ext cx="232956" cy="228600"/>
+          </a:xfrm>
+          <a:prstGeom prst="arc">
+            <a:avLst/>
+          </a:prstGeom>
+          <a:ln w="38100">
+            <a:solidFill>
+              <a:schemeClr val="tx1">
+                <a:lumMod val="75000"/>
+                <a:lumOff val="25000"/>
+              </a:schemeClr>
+            </a:solidFill>
+          </a:ln>
+        </p:spPr>
+        <p:style>
+          <a:lnRef idx="1">
+            <a:schemeClr val="accent1"/>
+          </a:lnRef>
+          <a:fillRef idx="0">
+            <a:schemeClr val="accent1"/>
+          </a:fillRef>
+          <a:effectRef idx="0">
+            <a:schemeClr val="accent1"/>
+          </a:effectRef>
+          <a:fontRef idx="minor">
+            <a:schemeClr val="tx1"/>
+          </a:fontRef>
+        </p:style>
+        <p:txBody>
+          <a:bodyPr rtlCol="0" anchor="ctr"/>
+          <a:lstStyle/>
+          <a:p>
+            <a:pPr algn="ctr"/>
+            <a:endParaRPr lang="en-US"/>
+          </a:p>
+        </p:txBody>
+      </p:sp>
+      <p:cxnSp>
+        <p:nvCxnSpPr>
+          <p:cNvPr id="46" name="Straight Connector 45"/>
+          <p:cNvCxnSpPr/>
+          <p:nvPr/>
+        </p:nvCxnSpPr>
+        <p:spPr>
+          <a:xfrm flipH="1">
+            <a:off x="7331938" y="2001107"/>
+            <a:ext cx="151312" cy="1168037"/>
+          </a:xfrm>
+          <a:prstGeom prst="line">
+            <a:avLst/>
+          </a:prstGeom>
+          <a:ln w="38100">
+            <a:solidFill>
+              <a:schemeClr val="tx1">
+                <a:lumMod val="75000"/>
+                <a:lumOff val="25000"/>
+              </a:schemeClr>
+            </a:solidFill>
+          </a:ln>
+        </p:spPr>
+        <p:style>
+          <a:lnRef idx="1">
+            <a:schemeClr val="accent1"/>
+          </a:lnRef>
+          <a:fillRef idx="0">
+            <a:schemeClr val="accent1"/>
+          </a:fillRef>
+          <a:effectRef idx="0">
+            <a:schemeClr val="accent1"/>
+          </a:effectRef>
+          <a:fontRef idx="minor">
+            <a:schemeClr val="tx1"/>
+          </a:fontRef>
+        </p:style>
+      </p:cxnSp>
+      <p:cxnSp>
+        <p:nvCxnSpPr>
+          <p:cNvPr id="47" name="Straight Connector 46"/>
+          <p:cNvCxnSpPr/>
+          <p:nvPr/>
+        </p:nvCxnSpPr>
+        <p:spPr>
+          <a:xfrm>
+            <a:off x="7178450" y="2001107"/>
+            <a:ext cx="153489" cy="1165315"/>
+          </a:xfrm>
+          <a:prstGeom prst="line">
+            <a:avLst/>
+          </a:prstGeom>
+          <a:ln w="38100">
+            <a:solidFill>
+              <a:schemeClr val="tx1">
+                <a:lumMod val="75000"/>
+                <a:lumOff val="25000"/>
+              </a:schemeClr>
+            </a:solidFill>
+          </a:ln>
+        </p:spPr>
+        <p:style>
+          <a:lnRef idx="1">
+            <a:schemeClr val="accent1"/>
+          </a:lnRef>
+          <a:fillRef idx="0">
+            <a:schemeClr val="accent1"/>
+          </a:fillRef>
+          <a:effectRef idx="0">
+            <a:schemeClr val="accent1"/>
+          </a:effectRef>
+          <a:fontRef idx="minor">
+            <a:schemeClr val="tx1"/>
+          </a:fontRef>
+        </p:style>
+      </p:cxnSp>
+      <p:cxnSp>
+        <p:nvCxnSpPr>
+          <p:cNvPr id="48" name="Straight Connector 47"/>
+          <p:cNvCxnSpPr/>
+          <p:nvPr/>
+        </p:nvCxnSpPr>
+        <p:spPr>
+          <a:xfrm>
+            <a:off x="6873649" y="2003829"/>
+            <a:ext cx="153489" cy="1165315"/>
+          </a:xfrm>
+          <a:prstGeom prst="line">
+            <a:avLst/>
+          </a:prstGeom>
+          <a:ln w="38100">
+            <a:solidFill>
+              <a:schemeClr val="tx1">
+                <a:lumMod val="75000"/>
+                <a:lumOff val="25000"/>
+              </a:schemeClr>
+            </a:solidFill>
+          </a:ln>
+        </p:spPr>
+        <p:style>
+          <a:lnRef idx="1">
+            <a:schemeClr val="accent1"/>
+          </a:lnRef>
+          <a:fillRef idx="0">
+            <a:schemeClr val="accent1"/>
+          </a:fillRef>
+          <a:effectRef idx="0">
+            <a:schemeClr val="accent1"/>
+          </a:effectRef>
+          <a:fontRef idx="minor">
+            <a:schemeClr val="tx1"/>
+          </a:fontRef>
+        </p:style>
+      </p:cxnSp>
+      <p:cxnSp>
+        <p:nvCxnSpPr>
+          <p:cNvPr id="49" name="Straight Connector 48"/>
+          <p:cNvCxnSpPr/>
+          <p:nvPr/>
+        </p:nvCxnSpPr>
+        <p:spPr>
+          <a:xfrm>
+            <a:off x="6566676" y="2012264"/>
+            <a:ext cx="153489" cy="1165315"/>
+          </a:xfrm>
+          <a:prstGeom prst="line">
+            <a:avLst/>
+          </a:prstGeom>
+          <a:ln w="38100">
+            <a:solidFill>
+              <a:schemeClr val="tx1">
+                <a:lumMod val="75000"/>
+                <a:lumOff val="25000"/>
+              </a:schemeClr>
+            </a:solidFill>
+          </a:ln>
+        </p:spPr>
+        <p:style>
+          <a:lnRef idx="1">
+            <a:schemeClr val="accent1"/>
+          </a:lnRef>
+          <a:fillRef idx="0">
+            <a:schemeClr val="accent1"/>
+          </a:fillRef>
+          <a:effectRef idx="0">
+            <a:schemeClr val="accent1"/>
+          </a:effectRef>
+          <a:fontRef idx="minor">
+            <a:schemeClr val="tx1"/>
+          </a:fontRef>
+        </p:style>
+      </p:cxnSp>
+      <p:cxnSp>
+        <p:nvCxnSpPr>
+          <p:cNvPr id="50" name="Straight Connector 49"/>
+          <p:cNvCxnSpPr/>
+          <p:nvPr/>
+        </p:nvCxnSpPr>
+        <p:spPr>
+          <a:xfrm flipH="1">
+            <a:off x="7027137" y="2022605"/>
+            <a:ext cx="151312" cy="1168037"/>
+          </a:xfrm>
+          <a:prstGeom prst="line">
+            <a:avLst/>
+          </a:prstGeom>
+          <a:ln w="38100">
+            <a:solidFill>
+              <a:schemeClr val="tx1">
+                <a:lumMod val="75000"/>
+                <a:lumOff val="25000"/>
+              </a:schemeClr>
+            </a:solidFill>
+          </a:ln>
+        </p:spPr>
+        <p:style>
+          <a:lnRef idx="1">
+            <a:schemeClr val="accent1"/>
+          </a:lnRef>
+          <a:fillRef idx="0">
+            <a:schemeClr val="accent1"/>
+          </a:fillRef>
+          <a:effectRef idx="0">
+            <a:schemeClr val="accent1"/>
+          </a:effectRef>
+          <a:fontRef idx="minor">
+            <a:schemeClr val="tx1"/>
+          </a:fontRef>
+        </p:style>
+      </p:cxnSp>
+      <p:cxnSp>
+        <p:nvCxnSpPr>
+          <p:cNvPr id="51" name="Straight Connector 50"/>
+          <p:cNvCxnSpPr/>
+          <p:nvPr/>
+        </p:nvCxnSpPr>
+        <p:spPr>
+          <a:xfrm flipH="1">
+            <a:off x="6727579" y="2003829"/>
+            <a:ext cx="151312" cy="1168037"/>
+          </a:xfrm>
+          <a:prstGeom prst="line">
+            <a:avLst/>
+          </a:prstGeom>
+          <a:ln w="38100">
+            <a:solidFill>
+              <a:schemeClr val="tx1">
+                <a:lumMod val="75000"/>
+                <a:lumOff val="25000"/>
+              </a:schemeClr>
+            </a:solidFill>
+          </a:ln>
+        </p:spPr>
+        <p:style>
+          <a:lnRef idx="1">
+            <a:schemeClr val="accent1"/>
+          </a:lnRef>
+          <a:fillRef idx="0">
+            <a:schemeClr val="accent1"/>
+          </a:fillRef>
+          <a:effectRef idx="0">
+            <a:schemeClr val="accent1"/>
+          </a:effectRef>
+          <a:fontRef idx="minor">
+            <a:schemeClr val="tx1"/>
+          </a:fontRef>
+        </p:style>
+      </p:cxnSp>
+      <p:cxnSp>
+        <p:nvCxnSpPr>
+          <p:cNvPr id="52" name="Straight Connector 51"/>
+          <p:cNvCxnSpPr/>
+          <p:nvPr/>
+        </p:nvCxnSpPr>
+        <p:spPr>
+          <a:xfrm flipH="1">
+            <a:off x="6415363" y="2012264"/>
+            <a:ext cx="151312" cy="1168037"/>
+          </a:xfrm>
+          <a:prstGeom prst="line">
+            <a:avLst/>
+          </a:prstGeom>
+          <a:ln w="38100">
+            <a:solidFill>
+              <a:schemeClr val="tx1">
+                <a:lumMod val="75000"/>
+                <a:lumOff val="25000"/>
+              </a:schemeClr>
+            </a:solidFill>
+          </a:ln>
+        </p:spPr>
+        <p:style>
+          <a:lnRef idx="1">
+            <a:schemeClr val="accent1"/>
+          </a:lnRef>
+          <a:fillRef idx="0">
+            <a:schemeClr val="accent1"/>
+          </a:fillRef>
+          <a:effectRef idx="0">
+            <a:schemeClr val="accent1"/>
+          </a:effectRef>
+          <a:fontRef idx="minor">
+            <a:schemeClr val="tx1"/>
+          </a:fontRef>
+        </p:style>
+      </p:cxnSp>
+      <p:cxnSp>
+        <p:nvCxnSpPr>
+          <p:cNvPr id="56" name="Straight Connector 55"/>
+          <p:cNvCxnSpPr/>
+          <p:nvPr/>
+        </p:nvCxnSpPr>
+        <p:spPr>
+          <a:xfrm>
+            <a:off x="9052560" y="1579828"/>
+            <a:ext cx="0" cy="1822269"/>
+          </a:xfrm>
+          <a:prstGeom prst="line">
+            <a:avLst/>
+          </a:prstGeom>
+          <a:ln w="76200">
+            <a:solidFill>
+              <a:schemeClr val="tx1">
+                <a:lumMod val="65000"/>
+                <a:lumOff val="35000"/>
+              </a:schemeClr>
+            </a:solidFill>
+          </a:ln>
+        </p:spPr>
+        <p:style>
+          <a:lnRef idx="1">
+            <a:schemeClr val="accent1"/>
+          </a:lnRef>
+          <a:fillRef idx="0">
+            <a:schemeClr val="accent1"/>
+          </a:fillRef>
+          <a:effectRef idx="0">
+            <a:schemeClr val="accent1"/>
+          </a:effectRef>
+          <a:fontRef idx="minor">
+            <a:schemeClr val="tx1"/>
+          </a:fontRef>
+        </p:style>
+      </p:cxnSp>
+      <p:sp>
+        <p:nvSpPr>
+          <p:cNvPr id="58" name="Freeform 57"/>
+          <p:cNvSpPr/>
+          <p:nvPr/>
+        </p:nvSpPr>
+        <p:spPr>
+          <a:xfrm>
+            <a:off x="8686800" y="1100041"/>
+            <a:ext cx="267997" cy="895623"/>
+          </a:xfrm>
+          <a:custGeom>
+            <a:avLst/>
+            <a:gdLst>
+              <a:gd name="connsiteX0" fmla="*/ 0 w 313508"/>
+              <a:gd name="connsiteY0" fmla="*/ 174172 h 931817"/>
+              <a:gd name="connsiteX1" fmla="*/ 0 w 313508"/>
+              <a:gd name="connsiteY1" fmla="*/ 0 h 931817"/>
+              <a:gd name="connsiteX2" fmla="*/ 313508 w 313508"/>
+              <a:gd name="connsiteY2" fmla="*/ 0 h 931817"/>
+              <a:gd name="connsiteX3" fmla="*/ 313508 w 313508"/>
+              <a:gd name="connsiteY3" fmla="*/ 931817 h 931817"/>
+              <a:gd name="connsiteX4" fmla="*/ 174171 w 313508"/>
+              <a:gd name="connsiteY4" fmla="*/ 931817 h 931817"/>
+              <a:gd name="connsiteX5" fmla="*/ 0 w 313508"/>
+              <a:gd name="connsiteY5" fmla="*/ 174172 h 931817"/>
+            </a:gdLst>
+            <a:ahLst/>
+            <a:cxnLst>
+              <a:cxn ang="0">
+                <a:pos x="connsiteX0" y="connsiteY0"/>
+              </a:cxn>
+              <a:cxn ang="0">
+                <a:pos x="connsiteX1" y="connsiteY1"/>
+              </a:cxn>
+              <a:cxn ang="0">
+                <a:pos x="connsiteX2" y="connsiteY2"/>
+              </a:cxn>
+              <a:cxn ang="0">
+                <a:pos x="connsiteX3" y="connsiteY3"/>
+              </a:cxn>
+              <a:cxn ang="0">
+                <a:pos x="connsiteX4" y="connsiteY4"/>
+              </a:cxn>
+              <a:cxn ang="0">
+                <a:pos x="connsiteX5" y="connsiteY5"/>
+              </a:cxn>
+            </a:cxnLst>
+            <a:rect l="l" t="t" r="r" b="b"/>
+            <a:pathLst>
+              <a:path w="313508" h="931817">
+                <a:moveTo>
+                  <a:pt x="0" y="174172"/>
+                </a:moveTo>
+                <a:lnTo>
+                  <a:pt x="0" y="0"/>
+                </a:lnTo>
+                <a:lnTo>
+                  <a:pt x="313508" y="0"/>
+                </a:lnTo>
+                <a:lnTo>
+                  <a:pt x="313508" y="931817"/>
+                </a:lnTo>
+                <a:lnTo>
+                  <a:pt x="174171" y="931817"/>
+                </a:lnTo>
+                <a:lnTo>
+                  <a:pt x="0" y="174172"/>
+                </a:lnTo>
+                <a:close/>
+              </a:path>
+            </a:pathLst>
+          </a:custGeom>
+          <a:solidFill>
+            <a:schemeClr val="bg1">
+              <a:lumMod val="65000"/>
+            </a:schemeClr>
+          </a:solidFill>
+          <a:ln>
+            <a:solidFill>
+              <a:schemeClr val="tx1">
+                <a:lumMod val="50000"/>
+                <a:lumOff val="50000"/>
+              </a:schemeClr>
+            </a:solidFill>
+          </a:ln>
+        </p:spPr>
+        <p:style>
+          <a:lnRef idx="2">
+            <a:schemeClr val="accent1">
+              <a:shade val="50000"/>
+            </a:schemeClr>
+          </a:lnRef>
+          <a:fillRef idx="1">
+            <a:schemeClr val="accent1"/>
+          </a:fillRef>
+          <a:effectRef idx="0">
+            <a:schemeClr val="accent1"/>
+          </a:effectRef>
+          <a:fontRef idx="minor">
+            <a:schemeClr val="lt1"/>
+          </a:fontRef>
+        </p:style>
+        <p:txBody>
+          <a:bodyPr rtlCol="0" anchor="ctr"/>
+          <a:lstStyle/>
+          <a:p>
+            <a:pPr algn="ctr"/>
+            <a:endParaRPr lang="en-US"/>
+          </a:p>
+        </p:txBody>
+      </p:sp>
+      <p:cxnSp>
+        <p:nvCxnSpPr>
+          <p:cNvPr id="61" name="Straight Connector 60"/>
+          <p:cNvCxnSpPr/>
+          <p:nvPr/>
+        </p:nvCxnSpPr>
+        <p:spPr>
+          <a:xfrm>
+            <a:off x="8617567" y="1023570"/>
+            <a:ext cx="0" cy="158931"/>
+          </a:xfrm>
+          <a:prstGeom prst="line">
+            <a:avLst/>
+          </a:prstGeom>
+          <a:ln w="76200">
+            <a:solidFill>
+              <a:schemeClr val="bg1">
+                <a:lumMod val="65000"/>
+              </a:schemeClr>
+            </a:solidFill>
+          </a:ln>
+        </p:spPr>
+        <p:style>
+          <a:lnRef idx="1">
+            <a:schemeClr val="accent1"/>
+          </a:lnRef>
+          <a:fillRef idx="0">
+            <a:schemeClr val="accent1"/>
+          </a:fillRef>
+          <a:effectRef idx="0">
+            <a:schemeClr val="accent1"/>
+          </a:effectRef>
+          <a:fontRef idx="minor">
+            <a:schemeClr val="tx1"/>
+          </a:fontRef>
+        </p:style>
+      </p:cxnSp>
+      <p:cxnSp>
+        <p:nvCxnSpPr>
+          <p:cNvPr id="64" name="Straight Connector 63"/>
+          <p:cNvCxnSpPr/>
+          <p:nvPr/>
+        </p:nvCxnSpPr>
+        <p:spPr>
+          <a:xfrm flipH="1">
+            <a:off x="8581105" y="1031047"/>
+            <a:ext cx="176556" cy="0"/>
+          </a:xfrm>
+          <a:prstGeom prst="line">
+            <a:avLst/>
+          </a:prstGeom>
+          <a:ln w="76200">
+            <a:solidFill>
+              <a:schemeClr val="bg1">
+                <a:lumMod val="65000"/>
+              </a:schemeClr>
+            </a:solidFill>
+          </a:ln>
+        </p:spPr>
+        <p:style>
+          <a:lnRef idx="1">
+            <a:schemeClr val="accent1"/>
+          </a:lnRef>
+          <a:fillRef idx="0">
+            <a:schemeClr val="accent1"/>
+          </a:fillRef>
+          <a:effectRef idx="0">
+            <a:schemeClr val="accent1"/>
+          </a:effectRef>
+          <a:fontRef idx="minor">
+            <a:schemeClr val="tx1"/>
+          </a:fontRef>
+        </p:style>
+      </p:cxnSp>
+      <p:sp>
+        <p:nvSpPr>
+          <p:cNvPr id="66" name="Freeform 65"/>
+          <p:cNvSpPr/>
+          <p:nvPr/>
+        </p:nvSpPr>
+        <p:spPr>
+          <a:xfrm rot="10800000" flipH="1">
+            <a:off x="8686800" y="3128084"/>
+            <a:ext cx="267997" cy="895623"/>
+          </a:xfrm>
+          <a:custGeom>
+            <a:avLst/>
+            <a:gdLst>
+              <a:gd name="connsiteX0" fmla="*/ 0 w 313508"/>
+              <a:gd name="connsiteY0" fmla="*/ 174172 h 931817"/>
+              <a:gd name="connsiteX1" fmla="*/ 0 w 313508"/>
+              <a:gd name="connsiteY1" fmla="*/ 0 h 931817"/>
+              <a:gd name="connsiteX2" fmla="*/ 313508 w 313508"/>
+              <a:gd name="connsiteY2" fmla="*/ 0 h 931817"/>
+              <a:gd name="connsiteX3" fmla="*/ 313508 w 313508"/>
+              <a:gd name="connsiteY3" fmla="*/ 931817 h 931817"/>
+              <a:gd name="connsiteX4" fmla="*/ 174171 w 313508"/>
+              <a:gd name="connsiteY4" fmla="*/ 931817 h 931817"/>
+              <a:gd name="connsiteX5" fmla="*/ 0 w 313508"/>
+              <a:gd name="connsiteY5" fmla="*/ 174172 h 931817"/>
+            </a:gdLst>
+            <a:ahLst/>
+            <a:cxnLst>
+              <a:cxn ang="0">
+                <a:pos x="connsiteX0" y="connsiteY0"/>
+              </a:cxn>
+              <a:cxn ang="0">
+                <a:pos x="connsiteX1" y="connsiteY1"/>
+              </a:cxn>
+              <a:cxn ang="0">
+                <a:pos x="connsiteX2" y="connsiteY2"/>
+              </a:cxn>
+              <a:cxn ang="0">
+                <a:pos x="connsiteX3" y="connsiteY3"/>
+              </a:cxn>
+              <a:cxn ang="0">
+                <a:pos x="connsiteX4" y="connsiteY4"/>
+              </a:cxn>
+              <a:cxn ang="0">
+                <a:pos x="connsiteX5" y="connsiteY5"/>
+              </a:cxn>
+            </a:cxnLst>
+            <a:rect l="l" t="t" r="r" b="b"/>
+            <a:pathLst>
+              <a:path w="313508" h="931817">
+                <a:moveTo>
+                  <a:pt x="0" y="174172"/>
+                </a:moveTo>
+                <a:lnTo>
+                  <a:pt x="0" y="0"/>
+                </a:lnTo>
+                <a:lnTo>
+                  <a:pt x="313508" y="0"/>
+                </a:lnTo>
+                <a:lnTo>
+                  <a:pt x="313508" y="931817"/>
+                </a:lnTo>
+                <a:lnTo>
+                  <a:pt x="174171" y="931817"/>
+                </a:lnTo>
+                <a:lnTo>
+                  <a:pt x="0" y="174172"/>
+                </a:lnTo>
+                <a:close/>
+              </a:path>
+            </a:pathLst>
+          </a:custGeom>
+          <a:solidFill>
+            <a:schemeClr val="bg1">
+              <a:lumMod val="65000"/>
+            </a:schemeClr>
+          </a:solidFill>
+          <a:ln>
+            <a:solidFill>
+              <a:schemeClr val="tx1">
+                <a:lumMod val="50000"/>
+                <a:lumOff val="50000"/>
+              </a:schemeClr>
+            </a:solidFill>
+          </a:ln>
+        </p:spPr>
+        <p:style>
+          <a:lnRef idx="2">
+            <a:schemeClr val="accent1">
+              <a:shade val="50000"/>
+            </a:schemeClr>
+          </a:lnRef>
+          <a:fillRef idx="1">
+            <a:schemeClr val="accent1"/>
+          </a:fillRef>
+          <a:effectRef idx="0">
+            <a:schemeClr val="accent1"/>
+          </a:effectRef>
+          <a:fontRef idx="minor">
+            <a:schemeClr val="lt1"/>
+          </a:fontRef>
+        </p:style>
+        <p:txBody>
+          <a:bodyPr rtlCol="0" anchor="ctr"/>
+          <a:lstStyle/>
+          <a:p>
+            <a:pPr algn="ctr"/>
+            <a:endParaRPr lang="en-US"/>
+          </a:p>
+        </p:txBody>
+      </p:sp>
+      <p:cxnSp>
+        <p:nvCxnSpPr>
+          <p:cNvPr id="68" name="Straight Connector 67"/>
+          <p:cNvCxnSpPr/>
+          <p:nvPr/>
+        </p:nvCxnSpPr>
+        <p:spPr>
+          <a:xfrm flipH="1">
+            <a:off x="8581105" y="4085347"/>
+            <a:ext cx="176556" cy="0"/>
+          </a:xfrm>
+          <a:prstGeom prst="line">
+            <a:avLst/>
+          </a:prstGeom>
+          <a:ln w="76200">
+            <a:solidFill>
+              <a:schemeClr val="bg1">
+                <a:lumMod val="65000"/>
+              </a:schemeClr>
+            </a:solidFill>
+          </a:ln>
+        </p:spPr>
+        <p:style>
+          <a:lnRef idx="1">
+            <a:schemeClr val="accent1"/>
+          </a:lnRef>
+          <a:fillRef idx="0">
+            <a:schemeClr val="accent1"/>
+          </a:fillRef>
+          <a:effectRef idx="0">
+            <a:schemeClr val="accent1"/>
+          </a:effectRef>
+          <a:fontRef idx="minor">
+            <a:schemeClr val="tx1"/>
+          </a:fontRef>
+        </p:style>
+      </p:cxnSp>
+      <p:cxnSp>
+        <p:nvCxnSpPr>
+          <p:cNvPr id="69" name="Straight Connector 68"/>
+          <p:cNvCxnSpPr/>
+          <p:nvPr/>
+        </p:nvCxnSpPr>
+        <p:spPr>
+          <a:xfrm>
+            <a:off x="8617567" y="3932949"/>
+            <a:ext cx="0" cy="158931"/>
+          </a:xfrm>
+          <a:prstGeom prst="line">
+            <a:avLst/>
+          </a:prstGeom>
+          <a:ln w="76200">
+            <a:solidFill>
+              <a:schemeClr val="bg1">
+                <a:lumMod val="65000"/>
+              </a:schemeClr>
+            </a:solidFill>
+          </a:ln>
+        </p:spPr>
+        <p:style>
+          <a:lnRef idx="1">
+            <a:schemeClr val="accent1"/>
+          </a:lnRef>
+          <a:fillRef idx="0">
+            <a:schemeClr val="accent1"/>
+          </a:fillRef>
+          <a:effectRef idx="0">
+            <a:schemeClr val="accent1"/>
+          </a:effectRef>
+          <a:fontRef idx="minor">
+            <a:schemeClr val="tx1"/>
+          </a:fontRef>
+        </p:style>
+      </p:cxnSp>
+      <p:cxnSp>
+        <p:nvCxnSpPr>
+          <p:cNvPr id="70" name="Straight Connector 69"/>
+          <p:cNvCxnSpPr/>
+          <p:nvPr/>
+        </p:nvCxnSpPr>
+        <p:spPr>
+          <a:xfrm flipH="1">
+            <a:off x="8844801" y="2556633"/>
+            <a:ext cx="273697" cy="0"/>
+          </a:xfrm>
+          <a:prstGeom prst="line">
+            <a:avLst/>
+          </a:prstGeom>
+          <a:ln w="76200">
+            <a:solidFill>
+              <a:schemeClr val="bg1"/>
+            </a:solidFill>
+          </a:ln>
+        </p:spPr>
+        <p:style>
+          <a:lnRef idx="1">
+            <a:schemeClr val="accent1"/>
+          </a:lnRef>
+          <a:fillRef idx="0">
+            <a:schemeClr val="accent1"/>
+          </a:fillRef>
+          <a:effectRef idx="0">
+            <a:schemeClr val="accent1"/>
+          </a:effectRef>
+          <a:fontRef idx="minor">
+            <a:schemeClr val="tx1"/>
+          </a:fontRef>
+        </p:style>
+      </p:cxnSp>
+      <p:sp>
+        <p:nvSpPr>
+          <p:cNvPr id="73" name="Rectangle 72"/>
+          <p:cNvSpPr/>
+          <p:nvPr/>
+        </p:nvSpPr>
+        <p:spPr>
+          <a:xfrm>
+            <a:off x="152400" y="2383194"/>
+            <a:ext cx="6002383" cy="316775"/>
+          </a:xfrm>
+          <a:prstGeom prst="rect">
+            <a:avLst/>
+          </a:prstGeom>
+          <a:solidFill>
+            <a:schemeClr val="bg1"/>
+          </a:solidFill>
+          <a:ln>
+            <a:solidFill>
+              <a:schemeClr val="tx1">
+                <a:lumMod val="50000"/>
+                <a:lumOff val="50000"/>
+              </a:schemeClr>
+            </a:solidFill>
+          </a:ln>
+        </p:spPr>
+        <p:style>
+          <a:lnRef idx="2">
+            <a:schemeClr val="accent1">
+              <a:shade val="50000"/>
+            </a:schemeClr>
+          </a:lnRef>
+          <a:fillRef idx="1">
+            <a:schemeClr val="accent1"/>
+          </a:fillRef>
+          <a:effectRef idx="0">
+            <a:schemeClr val="accent1"/>
+          </a:effectRef>
+          <a:fontRef idx="minor">
+            <a:schemeClr val="lt1"/>
+          </a:fontRef>
+        </p:style>
+        <p:txBody>
+          <a:bodyPr rtlCol="0" anchor="ctr"/>
+          <a:lstStyle/>
+          <a:p>
+            <a:pPr algn="ctr"/>
+            <a:endParaRPr lang="en-US"/>
+          </a:p>
+        </p:txBody>
+      </p:sp>
+      <p:sp>
+        <p:nvSpPr>
+          <p:cNvPr id="78" name="Rounded Rectangle 77"/>
+          <p:cNvSpPr/>
+          <p:nvPr/>
+        </p:nvSpPr>
+        <p:spPr>
+          <a:xfrm>
+            <a:off x="5280905" y="2437077"/>
+            <a:ext cx="723223" cy="209007"/>
+          </a:xfrm>
+          <a:prstGeom prst="roundRect">
+            <a:avLst/>
+          </a:prstGeom>
+          <a:solidFill>
+            <a:schemeClr val="tx1">
+              <a:lumMod val="75000"/>
+              <a:lumOff val="25000"/>
+            </a:schemeClr>
+          </a:solidFill>
+          <a:ln>
+            <a:solidFill>
+              <a:schemeClr val="tx1">
+                <a:lumMod val="75000"/>
+                <a:lumOff val="25000"/>
+              </a:schemeClr>
+            </a:solidFill>
+          </a:ln>
+        </p:spPr>
+        <p:style>
+          <a:lnRef idx="2">
+            <a:schemeClr val="accent1">
+              <a:shade val="50000"/>
+            </a:schemeClr>
+          </a:lnRef>
+          <a:fillRef idx="1">
+            <a:schemeClr val="accent1"/>
+          </a:fillRef>
+          <a:effectRef idx="0">
+            <a:schemeClr val="accent1"/>
+          </a:effectRef>
+          <a:fontRef idx="minor">
+            <a:schemeClr val="lt1"/>
+          </a:fontRef>
+        </p:style>
+        <p:txBody>
+          <a:bodyPr rtlCol="0" anchor="ctr"/>
+          <a:lstStyle/>
+          <a:p>
+            <a:pPr algn="ctr"/>
+            <a:endParaRPr lang="en-US"/>
+          </a:p>
+        </p:txBody>
+      </p:sp>
+      <p:cxnSp>
+        <p:nvCxnSpPr>
+          <p:cNvPr id="82" name="Straight Connector 81"/>
+          <p:cNvCxnSpPr/>
+          <p:nvPr/>
+        </p:nvCxnSpPr>
+        <p:spPr>
+          <a:xfrm>
+            <a:off x="6154783" y="2318968"/>
+            <a:ext cx="0" cy="492982"/>
+          </a:xfrm>
+          <a:prstGeom prst="line">
+            <a:avLst/>
+          </a:prstGeom>
+          <a:ln w="28575">
+            <a:solidFill>
+              <a:schemeClr val="bg1"/>
+            </a:solidFill>
+          </a:ln>
+        </p:spPr>
+        <p:style>
+          <a:lnRef idx="1">
+            <a:schemeClr val="accent1"/>
+          </a:lnRef>
+          <a:fillRef idx="0">
+            <a:schemeClr val="accent1"/>
+          </a:fillRef>
+          <a:effectRef idx="0">
+            <a:schemeClr val="accent1"/>
+          </a:effectRef>
+          <a:fontRef idx="minor">
+            <a:schemeClr val="tx1"/>
+          </a:fontRef>
+        </p:style>
+      </p:cxnSp>
+      <p:sp>
+        <p:nvSpPr>
+          <p:cNvPr id="80" name="Rectangle 79"/>
+          <p:cNvSpPr/>
+          <p:nvPr/>
+        </p:nvSpPr>
+        <p:spPr>
+          <a:xfrm>
+            <a:off x="6041786" y="2423606"/>
+            <a:ext cx="225995" cy="235947"/>
+          </a:xfrm>
+          <a:prstGeom prst="rect">
+            <a:avLst/>
+          </a:prstGeom>
+          <a:solidFill>
+            <a:schemeClr val="bg1">
+              <a:lumMod val="65000"/>
+            </a:schemeClr>
+          </a:solidFill>
+          <a:ln>
+            <a:solidFill>
+              <a:schemeClr val="tx1">
+                <a:lumMod val="65000"/>
+                <a:lumOff val="35000"/>
+              </a:schemeClr>
+            </a:solidFill>
+          </a:ln>
+        </p:spPr>
+        <p:style>
+          <a:lnRef idx="2">
+            <a:schemeClr val="accent1">
+              <a:shade val="50000"/>
+            </a:schemeClr>
+          </a:lnRef>
+          <a:fillRef idx="1">
+            <a:schemeClr val="accent1"/>
+          </a:fillRef>
+          <a:effectRef idx="0">
+            <a:schemeClr val="accent1"/>
+          </a:effectRef>
+          <a:fontRef idx="minor">
+            <a:schemeClr val="lt1"/>
+          </a:fontRef>
+        </p:style>
+        <p:txBody>
+          <a:bodyPr rtlCol="0" anchor="ctr"/>
+          <a:lstStyle/>
+          <a:p>
+            <a:pPr algn="ctr"/>
+            <a:endParaRPr lang="en-US"/>
+          </a:p>
+        </p:txBody>
+      </p:sp>
+      <p:sp>
+        <p:nvSpPr>
+          <p:cNvPr id="83" name="Rectangle 82"/>
+          <p:cNvSpPr/>
+          <p:nvPr/>
+        </p:nvSpPr>
+        <p:spPr>
+          <a:xfrm>
+            <a:off x="152400" y="2391905"/>
+            <a:ext cx="5087983" cy="308062"/>
+          </a:xfrm>
+          <a:prstGeom prst="rect">
+            <a:avLst/>
+          </a:prstGeom>
+          <a:solidFill>
+            <a:schemeClr val="bg1">
+              <a:lumMod val="50000"/>
+            </a:schemeClr>
+          </a:solidFill>
+          <a:ln>
+            <a:solidFill>
+              <a:schemeClr val="bg1">
+                <a:lumMod val="50000"/>
+              </a:schemeClr>
+            </a:solidFill>
+          </a:ln>
+        </p:spPr>
+        <p:style>
+          <a:lnRef idx="2">
+            <a:schemeClr val="accent1">
+              <a:shade val="50000"/>
+            </a:schemeClr>
+          </a:lnRef>
+          <a:fillRef idx="1">
+            <a:schemeClr val="accent1"/>
+          </a:fillRef>
+          <a:effectRef idx="0">
+            <a:schemeClr val="accent1"/>
+          </a:effectRef>
+          <a:fontRef idx="minor">
+            <a:schemeClr val="lt1"/>
+          </a:fontRef>
+        </p:style>
+        <p:txBody>
+          <a:bodyPr rtlCol="0" anchor="ctr"/>
+          <a:lstStyle/>
+          <a:p>
+            <a:pPr algn="ctr"/>
+            <a:endParaRPr lang="en-US"/>
+          </a:p>
+        </p:txBody>
+      </p:sp>
+    </p:spTree>
+    <p:extLst>
+      <p:ext uri="{BB962C8B-B14F-4D97-AF65-F5344CB8AC3E}">
+        <p14:creationId xmlns:p14="http://schemas.microsoft.com/office/powerpoint/2010/main" val="1998776290"/>
       </p:ext>
     </p:extLst>
   </p:cSld>

</xml_diff>

<commit_message>
worked on ion beam figure
</commit_message>
<xml_diff>
--- a/figures/ionBeam.pptx
+++ b/figures/ionBeam.pptx
@@ -7060,8 +7060,8 @@
         </p:nvSpPr>
         <p:spPr>
           <a:xfrm>
-            <a:off x="4724401" y="2989674"/>
-            <a:ext cx="183741" cy="416658"/>
+            <a:off x="4442022" y="2968103"/>
+            <a:ext cx="412342" cy="416658"/>
           </a:xfrm>
           <a:prstGeom prst="rect">
             <a:avLst/>
@@ -7107,73 +7107,14 @@
       </p:sp>
       <p:sp>
         <p:nvSpPr>
-          <p:cNvPr id="80" name="Rectangle 79"/>
-          <p:cNvSpPr/>
-          <p:nvPr/>
-        </p:nvSpPr>
-        <p:spPr>
-          <a:xfrm>
-            <a:off x="4958328" y="3073827"/>
-            <a:ext cx="183741" cy="416658"/>
-          </a:xfrm>
-          <a:prstGeom prst="rect">
-            <a:avLst/>
-          </a:prstGeom>
-          <a:solidFill>
-            <a:schemeClr val="bg1">
-              <a:lumMod val="85000"/>
-            </a:schemeClr>
-          </a:solidFill>
-          <a:ln>
-            <a:solidFill>
-              <a:schemeClr val="tx1">
-                <a:lumMod val="65000"/>
-                <a:lumOff val="35000"/>
-              </a:schemeClr>
-            </a:solidFill>
-          </a:ln>
-          <a:scene3d>
-            <a:camera prst="orthographicFront">
-              <a:rot lat="17879451" lon="2593180" rev="19200000"/>
-            </a:camera>
-            <a:lightRig rig="threePt" dir="t"/>
-          </a:scene3d>
-        </p:spPr>
-        <p:style>
-          <a:lnRef idx="2">
-            <a:schemeClr val="accent1">
-              <a:shade val="50000"/>
-            </a:schemeClr>
-          </a:lnRef>
-          <a:fillRef idx="1">
-            <a:schemeClr val="accent1"/>
-          </a:fillRef>
-          <a:effectRef idx="0">
-            <a:schemeClr val="accent1"/>
-          </a:effectRef>
-          <a:fontRef idx="minor">
-            <a:schemeClr val="lt1"/>
-          </a:fontRef>
-        </p:style>
-        <p:txBody>
-          <a:bodyPr rtlCol="0" anchor="ctr"/>
-          <a:lstStyle/>
-          <a:p>
-            <a:pPr algn="ctr"/>
-            <a:endParaRPr lang="en-US"/>
-          </a:p>
-        </p:txBody>
-      </p:sp>
-      <p:sp>
-        <p:nvSpPr>
           <p:cNvPr id="101" name="Rectangle 100"/>
           <p:cNvSpPr/>
           <p:nvPr/>
         </p:nvSpPr>
         <p:spPr>
           <a:xfrm>
-            <a:off x="4114800" y="2987706"/>
-            <a:ext cx="266700" cy="377452"/>
+            <a:off x="3921614" y="3026356"/>
+            <a:ext cx="209186" cy="373614"/>
           </a:xfrm>
           <a:prstGeom prst="rect">
             <a:avLst/>
@@ -7602,43 +7543,6 @@
             <a:solidFill>
               <a:schemeClr val="bg1"/>
             </a:solidFill>
-          </a:ln>
-        </p:spPr>
-        <p:style>
-          <a:lnRef idx="1">
-            <a:schemeClr val="accent1"/>
-          </a:lnRef>
-          <a:fillRef idx="0">
-            <a:schemeClr val="accent1"/>
-          </a:fillRef>
-          <a:effectRef idx="0">
-            <a:schemeClr val="accent1"/>
-          </a:effectRef>
-          <a:fontRef idx="minor">
-            <a:schemeClr val="tx1"/>
-          </a:fontRef>
-        </p:style>
-      </p:cxnSp>
-      <p:cxnSp>
-        <p:nvCxnSpPr>
-          <p:cNvPr id="108" name="Straight Arrow Connector 107"/>
-          <p:cNvCxnSpPr/>
-          <p:nvPr/>
-        </p:nvCxnSpPr>
-        <p:spPr>
-          <a:xfrm>
-            <a:off x="647268" y="3237583"/>
-            <a:ext cx="6210732" cy="0"/>
-          </a:xfrm>
-          <a:prstGeom prst="straightConnector1">
-            <a:avLst/>
-          </a:prstGeom>
-          <a:ln w="28575">
-            <a:solidFill>
-              <a:srgbClr val="FFC000"/>
-            </a:solidFill>
-            <a:prstDash val="sysDot"/>
-            <a:tailEnd type="arrow"/>
           </a:ln>
         </p:spPr>
         <p:style>
@@ -8299,8 +8203,8 @@
         </p:nvSpPr>
         <p:spPr>
           <a:xfrm>
-            <a:off x="3962400" y="3073829"/>
-            <a:ext cx="304800" cy="431373"/>
+            <a:off x="3817021" y="3134476"/>
+            <a:ext cx="209186" cy="382394"/>
           </a:xfrm>
           <a:prstGeom prst="rect">
             <a:avLst/>
@@ -8352,8 +8256,8 @@
         </p:nvSpPr>
         <p:spPr>
           <a:xfrm>
-            <a:off x="4648201" y="3073827"/>
-            <a:ext cx="183741" cy="416658"/>
+            <a:off x="4267200" y="3107336"/>
+            <a:ext cx="412343" cy="416658"/>
           </a:xfrm>
           <a:prstGeom prst="rect">
             <a:avLst/>
@@ -8652,116 +8556,6 @@
           </a:fontRef>
         </p:style>
       </p:cxnSp>
-      <p:cxnSp>
-        <p:nvCxnSpPr>
-          <p:cNvPr id="129" name="Straight Connector 128"/>
-          <p:cNvCxnSpPr/>
-          <p:nvPr/>
-        </p:nvCxnSpPr>
-        <p:spPr>
-          <a:xfrm>
-            <a:off x="5484894" y="3233412"/>
-            <a:ext cx="87683" cy="1360"/>
-          </a:xfrm>
-          <a:prstGeom prst="line">
-            <a:avLst/>
-          </a:prstGeom>
-          <a:ln w="28575">
-            <a:solidFill>
-              <a:srgbClr val="FFC000"/>
-            </a:solidFill>
-            <a:prstDash val="sysDot"/>
-          </a:ln>
-        </p:spPr>
-        <p:style>
-          <a:lnRef idx="1">
-            <a:schemeClr val="accent1"/>
-          </a:lnRef>
-          <a:fillRef idx="0">
-            <a:schemeClr val="accent1"/>
-          </a:fillRef>
-          <a:effectRef idx="0">
-            <a:schemeClr val="accent1"/>
-          </a:effectRef>
-          <a:fontRef idx="minor">
-            <a:schemeClr val="tx1"/>
-          </a:fontRef>
-        </p:style>
-      </p:cxnSp>
-      <p:cxnSp>
-        <p:nvCxnSpPr>
-          <p:cNvPr id="132" name="Straight Connector 131"/>
-          <p:cNvCxnSpPr/>
-          <p:nvPr/>
-        </p:nvCxnSpPr>
-        <p:spPr>
-          <a:xfrm>
-            <a:off x="5676141" y="3235863"/>
-            <a:ext cx="87683" cy="1360"/>
-          </a:xfrm>
-          <a:prstGeom prst="line">
-            <a:avLst/>
-          </a:prstGeom>
-          <a:ln w="28575">
-            <a:solidFill>
-              <a:srgbClr val="FFC000"/>
-            </a:solidFill>
-            <a:prstDash val="sysDot"/>
-          </a:ln>
-        </p:spPr>
-        <p:style>
-          <a:lnRef idx="1">
-            <a:schemeClr val="accent1"/>
-          </a:lnRef>
-          <a:fillRef idx="0">
-            <a:schemeClr val="accent1"/>
-          </a:fillRef>
-          <a:effectRef idx="0">
-            <a:schemeClr val="accent1"/>
-          </a:effectRef>
-          <a:fontRef idx="minor">
-            <a:schemeClr val="tx1"/>
-          </a:fontRef>
-        </p:style>
-      </p:cxnSp>
-      <p:cxnSp>
-        <p:nvCxnSpPr>
-          <p:cNvPr id="133" name="Straight Connector 132"/>
-          <p:cNvCxnSpPr>
-            <a:endCxn id="94" idx="6"/>
-          </p:cNvCxnSpPr>
-          <p:nvPr/>
-        </p:nvCxnSpPr>
-        <p:spPr>
-          <a:xfrm flipV="1">
-            <a:off x="5887097" y="3237582"/>
-            <a:ext cx="160504" cy="408"/>
-          </a:xfrm>
-          <a:prstGeom prst="line">
-            <a:avLst/>
-          </a:prstGeom>
-          <a:ln w="28575">
-            <a:solidFill>
-              <a:srgbClr val="FFC000"/>
-            </a:solidFill>
-            <a:prstDash val="sysDot"/>
-          </a:ln>
-        </p:spPr>
-        <p:style>
-          <a:lnRef idx="1">
-            <a:schemeClr val="accent1"/>
-          </a:lnRef>
-          <a:fillRef idx="0">
-            <a:schemeClr val="accent1"/>
-          </a:fillRef>
-          <a:effectRef idx="0">
-            <a:schemeClr val="accent1"/>
-          </a:effectRef>
-          <a:fontRef idx="minor">
-            <a:schemeClr val="tx1"/>
-          </a:fontRef>
-        </p:style>
-      </p:cxnSp>
       <p:sp>
         <p:nvSpPr>
           <p:cNvPr id="136" name="TextBox 135"/>
@@ -9413,17 +9207,324 @@
       </p:sp>
       <p:sp>
         <p:nvSpPr>
-          <p:cNvPr id="79" name="Rectangle 78"/>
+          <p:cNvPr id="84" name="TextBox 83"/>
+          <p:cNvSpPr txBox="1"/>
+          <p:nvPr/>
+        </p:nvSpPr>
+        <p:spPr>
+          <a:xfrm>
+            <a:off x="1229043" y="2438402"/>
+            <a:ext cx="624595" cy="646331"/>
+          </a:xfrm>
+          <a:prstGeom prst="rect">
+            <a:avLst/>
+          </a:prstGeom>
+          <a:noFill/>
+        </p:spPr>
+        <p:txBody>
+          <a:bodyPr wrap="none" rtlCol="0">
+            <a:spAutoFit/>
+          </a:bodyPr>
+          <a:lstStyle/>
+          <a:p>
+            <a:pPr algn="ctr"/>
+            <a:r>
+              <a:rPr lang="en-US" i="1" dirty="0" smtClean="0"/>
+              <a:t>E</a:t>
+            </a:r>
+            <a:r>
+              <a:rPr lang="az-Cyrl-AZ" i="1" dirty="0" smtClean="0"/>
+              <a:t>х</a:t>
+            </a:r>
+            <a:r>
+              <a:rPr lang="en-US" i="1" dirty="0" smtClean="0"/>
+              <a:t>B</a:t>
+            </a:r>
+          </a:p>
+          <a:p>
+            <a:pPr algn="ctr"/>
+            <a:r>
+              <a:rPr lang="en-US" i="1" dirty="0" smtClean="0"/>
+              <a:t>filter</a:t>
+            </a:r>
+            <a:endParaRPr lang="en-US" i="1" dirty="0"/>
+          </a:p>
+        </p:txBody>
+      </p:sp>
+      <p:sp>
+        <p:nvSpPr>
+          <p:cNvPr id="85" name="TextBox 84"/>
+          <p:cNvSpPr txBox="1"/>
+          <p:nvPr/>
+        </p:nvSpPr>
+        <p:spPr>
+          <a:xfrm>
+            <a:off x="54898" y="2438402"/>
+            <a:ext cx="795539" cy="646331"/>
+          </a:xfrm>
+          <a:prstGeom prst="rect">
+            <a:avLst/>
+          </a:prstGeom>
+          <a:noFill/>
+        </p:spPr>
+        <p:txBody>
+          <a:bodyPr wrap="none" rtlCol="0">
+            <a:spAutoFit/>
+          </a:bodyPr>
+          <a:lstStyle/>
+          <a:p>
+            <a:pPr algn="ctr"/>
+            <a:r>
+              <a:rPr lang="en-US" i="1" dirty="0" smtClean="0"/>
+              <a:t>Ba</a:t>
+            </a:r>
+            <a:r>
+              <a:rPr lang="en-US" b="1" i="1" baseline="30000" dirty="0" smtClean="0"/>
+              <a:t>+</a:t>
+            </a:r>
+          </a:p>
+          <a:p>
+            <a:pPr algn="ctr"/>
+            <a:r>
+              <a:rPr lang="en-US" i="1" dirty="0" smtClean="0"/>
+              <a:t>source</a:t>
+            </a:r>
+            <a:endParaRPr lang="en-US" i="1" dirty="0"/>
+          </a:p>
+        </p:txBody>
+      </p:sp>
+      <p:sp>
+        <p:nvSpPr>
+          <p:cNvPr id="86" name="TextBox 85"/>
+          <p:cNvSpPr txBox="1"/>
+          <p:nvPr/>
+        </p:nvSpPr>
+        <p:spPr>
+          <a:xfrm>
+            <a:off x="3420552" y="4306222"/>
+            <a:ext cx="854721" cy="646331"/>
+          </a:xfrm>
+          <a:prstGeom prst="rect">
+            <a:avLst/>
+          </a:prstGeom>
+          <a:noFill/>
+        </p:spPr>
+        <p:txBody>
+          <a:bodyPr wrap="none" rtlCol="0">
+            <a:spAutoFit/>
+          </a:bodyPr>
+          <a:lstStyle/>
+          <a:p>
+            <a:pPr algn="ctr"/>
+            <a:r>
+              <a:rPr lang="en-US" i="1" dirty="0" smtClean="0"/>
+              <a:t>pulsing</a:t>
+            </a:r>
+          </a:p>
+          <a:p>
+            <a:pPr algn="ctr"/>
+            <a:r>
+              <a:rPr lang="en-US" i="1" dirty="0" smtClean="0"/>
+              <a:t>plates</a:t>
+            </a:r>
+          </a:p>
+        </p:txBody>
+      </p:sp>
+      <p:sp>
+        <p:nvSpPr>
+          <p:cNvPr id="98" name="TextBox 97"/>
+          <p:cNvSpPr txBox="1"/>
+          <p:nvPr/>
+        </p:nvSpPr>
+        <p:spPr>
+          <a:xfrm>
+            <a:off x="5219589" y="3516870"/>
+            <a:ext cx="1056701" cy="646331"/>
+          </a:xfrm>
+          <a:prstGeom prst="rect">
+            <a:avLst/>
+          </a:prstGeom>
+          <a:noFill/>
+        </p:spPr>
+        <p:txBody>
+          <a:bodyPr wrap="none" rtlCol="0">
+            <a:spAutoFit/>
+          </a:bodyPr>
+          <a:lstStyle/>
+          <a:p>
+            <a:pPr algn="ctr"/>
+            <a:r>
+              <a:rPr lang="en-US" i="1" dirty="0" smtClean="0"/>
+              <a:t>induction</a:t>
+            </a:r>
+          </a:p>
+          <a:p>
+            <a:pPr algn="ctr"/>
+            <a:r>
+              <a:rPr lang="en-US" i="1" dirty="0" smtClean="0"/>
+              <a:t>plates</a:t>
+            </a:r>
+          </a:p>
+        </p:txBody>
+      </p:sp>
+      <p:sp>
+        <p:nvSpPr>
+          <p:cNvPr id="99" name="TextBox 98"/>
+          <p:cNvSpPr txBox="1"/>
+          <p:nvPr/>
+        </p:nvSpPr>
+        <p:spPr>
+          <a:xfrm>
+            <a:off x="5817589" y="2401671"/>
+            <a:ext cx="942950" cy="646331"/>
+          </a:xfrm>
+          <a:prstGeom prst="rect">
+            <a:avLst/>
+          </a:prstGeom>
+          <a:noFill/>
+        </p:spPr>
+        <p:txBody>
+          <a:bodyPr wrap="none" rtlCol="0">
+            <a:spAutoFit/>
+          </a:bodyPr>
+          <a:lstStyle/>
+          <a:p>
+            <a:pPr algn="ctr"/>
+            <a:r>
+              <a:rPr lang="en-US" i="1" dirty="0" smtClean="0"/>
+              <a:t>Faraday</a:t>
+            </a:r>
+          </a:p>
+          <a:p>
+            <a:pPr algn="ctr"/>
+            <a:r>
+              <a:rPr lang="en-US" i="1" dirty="0" smtClean="0"/>
+              <a:t>cup</a:t>
+            </a:r>
+          </a:p>
+        </p:txBody>
+      </p:sp>
+      <p:sp>
+        <p:nvSpPr>
+          <p:cNvPr id="73" name="TextBox 72"/>
+          <p:cNvSpPr txBox="1"/>
+          <p:nvPr/>
+        </p:nvSpPr>
+        <p:spPr>
+          <a:xfrm>
+            <a:off x="6545326" y="3549134"/>
+            <a:ext cx="922497" cy="369332"/>
+          </a:xfrm>
+          <a:prstGeom prst="rect">
+            <a:avLst/>
+          </a:prstGeom>
+          <a:noFill/>
+        </p:spPr>
+        <p:txBody>
+          <a:bodyPr wrap="none" rtlCol="0">
+            <a:spAutoFit/>
+          </a:bodyPr>
+          <a:lstStyle/>
+          <a:p>
+            <a:pPr algn="ctr"/>
+            <a:r>
+              <a:rPr lang="en-US" i="1" dirty="0" smtClean="0"/>
+              <a:t>window</a:t>
+            </a:r>
+          </a:p>
+        </p:txBody>
+      </p:sp>
+      <p:sp>
+        <p:nvSpPr>
+          <p:cNvPr id="76" name="TextBox 75"/>
+          <p:cNvSpPr txBox="1"/>
+          <p:nvPr/>
+        </p:nvSpPr>
+        <p:spPr>
+          <a:xfrm>
+            <a:off x="1840049" y="3477657"/>
+            <a:ext cx="720005" cy="646331"/>
+          </a:xfrm>
+          <a:prstGeom prst="rect">
+            <a:avLst/>
+          </a:prstGeom>
+          <a:noFill/>
+        </p:spPr>
+        <p:txBody>
+          <a:bodyPr wrap="none" rtlCol="0">
+            <a:spAutoFit/>
+          </a:bodyPr>
+          <a:lstStyle/>
+          <a:p>
+            <a:pPr algn="ctr"/>
+            <a:r>
+              <a:rPr lang="en-US" i="1" dirty="0" smtClean="0"/>
+              <a:t>Einzel</a:t>
+            </a:r>
+          </a:p>
+          <a:p>
+            <a:pPr algn="ctr"/>
+            <a:r>
+              <a:rPr lang="en-US" i="1" dirty="0" smtClean="0"/>
+              <a:t>lens</a:t>
+            </a:r>
+            <a:endParaRPr lang="en-US" i="1" dirty="0"/>
+          </a:p>
+        </p:txBody>
+      </p:sp>
+      <p:sp>
+        <p:nvSpPr>
+          <p:cNvPr id="96" name="TextBox 95"/>
+          <p:cNvSpPr txBox="1"/>
+          <p:nvPr/>
+        </p:nvSpPr>
+        <p:spPr>
+          <a:xfrm>
+            <a:off x="406701" y="3649334"/>
+            <a:ext cx="1330493" cy="646331"/>
+          </a:xfrm>
+          <a:prstGeom prst="rect">
+            <a:avLst/>
+          </a:prstGeom>
+          <a:noFill/>
+        </p:spPr>
+        <p:txBody>
+          <a:bodyPr wrap="none" rtlCol="0">
+            <a:spAutoFit/>
+          </a:bodyPr>
+          <a:lstStyle/>
+          <a:p>
+            <a:pPr algn="ctr"/>
+            <a:r>
+              <a:rPr lang="en-US" i="1" dirty="0" smtClean="0"/>
+              <a:t>accelerating</a:t>
+            </a:r>
+          </a:p>
+          <a:p>
+            <a:pPr algn="ctr"/>
+            <a:r>
+              <a:rPr lang="en-US" i="1" dirty="0" smtClean="0"/>
+              <a:t>lens</a:t>
+            </a:r>
+            <a:endParaRPr lang="en-US" i="1" dirty="0"/>
+          </a:p>
+        </p:txBody>
+      </p:sp>
+      <p:sp>
+        <p:nvSpPr>
+          <p:cNvPr id="3" name="Parallelogram 2"/>
           <p:cNvSpPr/>
           <p:nvPr/>
         </p:nvSpPr>
         <p:spPr>
           <a:xfrm>
-            <a:off x="4953001" y="2961969"/>
-            <a:ext cx="183741" cy="416658"/>
-          </a:xfrm>
-          <a:prstGeom prst="rect">
-            <a:avLst/>
+            <a:off x="4724710" y="2968103"/>
+            <a:ext cx="586853" cy="232291"/>
+          </a:xfrm>
+          <a:prstGeom prst="parallelogram">
+            <a:avLst>
+              <a:gd name="adj" fmla="val 84381"/>
+            </a:avLst>
           </a:prstGeom>
           <a:solidFill>
             <a:schemeClr val="bg1">
@@ -9438,12 +9539,6 @@
               </a:schemeClr>
             </a:solidFill>
           </a:ln>
-          <a:scene3d>
-            <a:camera prst="orthographicFront">
-              <a:rot lat="17879451" lon="2593180" rev="19200000"/>
-            </a:camera>
-            <a:lightRig rig="threePt" dir="t"/>
-          </a:scene3d>
         </p:spPr>
         <p:style>
           <a:lnRef idx="2">
@@ -9472,385 +9567,56 @@
       </p:sp>
       <p:sp>
         <p:nvSpPr>
-          <p:cNvPr id="84" name="TextBox 83"/>
-          <p:cNvSpPr txBox="1"/>
-          <p:nvPr/>
-        </p:nvSpPr>
-        <p:spPr>
-          <a:xfrm>
-            <a:off x="1229043" y="2438402"/>
-            <a:ext cx="624595" cy="646331"/>
-          </a:xfrm>
-          <a:prstGeom prst="rect">
-            <a:avLst/>
-          </a:prstGeom>
-          <a:noFill/>
-        </p:spPr>
-        <p:txBody>
-          <a:bodyPr wrap="none" rtlCol="0">
-            <a:spAutoFit/>
-          </a:bodyPr>
+          <p:cNvPr id="81" name="Parallelogram 80"/>
+          <p:cNvSpPr/>
+          <p:nvPr/>
+        </p:nvSpPr>
+        <p:spPr>
+          <a:xfrm>
+            <a:off x="4724710" y="3291703"/>
+            <a:ext cx="586853" cy="232291"/>
+          </a:xfrm>
+          <a:prstGeom prst="parallelogram">
+            <a:avLst>
+              <a:gd name="adj" fmla="val 84381"/>
+            </a:avLst>
+          </a:prstGeom>
+          <a:solidFill>
+            <a:schemeClr val="bg1">
+              <a:lumMod val="85000"/>
+            </a:schemeClr>
+          </a:solidFill>
+          <a:ln>
+            <a:solidFill>
+              <a:schemeClr val="tx1">
+                <a:lumMod val="65000"/>
+                <a:lumOff val="35000"/>
+              </a:schemeClr>
+            </a:solidFill>
+          </a:ln>
+        </p:spPr>
+        <p:style>
+          <a:lnRef idx="2">
+            <a:schemeClr val="accent1">
+              <a:shade val="50000"/>
+            </a:schemeClr>
+          </a:lnRef>
+          <a:fillRef idx="1">
+            <a:schemeClr val="accent1"/>
+          </a:fillRef>
+          <a:effectRef idx="0">
+            <a:schemeClr val="accent1"/>
+          </a:effectRef>
+          <a:fontRef idx="minor">
+            <a:schemeClr val="lt1"/>
+          </a:fontRef>
+        </p:style>
+        <p:txBody>
+          <a:bodyPr rtlCol="0" anchor="ctr"/>
           <a:lstStyle/>
           <a:p>
             <a:pPr algn="ctr"/>
-            <a:r>
-              <a:rPr lang="en-US" i="1" dirty="0" smtClean="0"/>
-              <a:t>E</a:t>
-            </a:r>
-            <a:r>
-              <a:rPr lang="az-Cyrl-AZ" i="1" dirty="0" smtClean="0"/>
-              <a:t>х</a:t>
-            </a:r>
-            <a:r>
-              <a:rPr lang="en-US" i="1" dirty="0" smtClean="0"/>
-              <a:t>B</a:t>
-            </a:r>
-          </a:p>
-          <a:p>
-            <a:pPr algn="ctr"/>
-            <a:r>
-              <a:rPr lang="en-US" i="1" dirty="0" smtClean="0"/>
-              <a:t>filter</a:t>
-            </a:r>
-            <a:endParaRPr lang="en-US" i="1" dirty="0"/>
-          </a:p>
-        </p:txBody>
-      </p:sp>
-      <p:sp>
-        <p:nvSpPr>
-          <p:cNvPr id="85" name="TextBox 84"/>
-          <p:cNvSpPr txBox="1"/>
-          <p:nvPr/>
-        </p:nvSpPr>
-        <p:spPr>
-          <a:xfrm>
-            <a:off x="54898" y="2438402"/>
-            <a:ext cx="795539" cy="646331"/>
-          </a:xfrm>
-          <a:prstGeom prst="rect">
-            <a:avLst/>
-          </a:prstGeom>
-          <a:noFill/>
-        </p:spPr>
-        <p:txBody>
-          <a:bodyPr wrap="none" rtlCol="0">
-            <a:spAutoFit/>
-          </a:bodyPr>
-          <a:lstStyle/>
-          <a:p>
-            <a:pPr algn="ctr"/>
-            <a:r>
-              <a:rPr lang="en-US" i="1" dirty="0" smtClean="0"/>
-              <a:t>Ba</a:t>
-            </a:r>
-            <a:r>
-              <a:rPr lang="en-US" b="1" i="1" baseline="30000" dirty="0" smtClean="0"/>
-              <a:t>+</a:t>
-            </a:r>
-          </a:p>
-          <a:p>
-            <a:pPr algn="ctr"/>
-            <a:r>
-              <a:rPr lang="en-US" i="1" dirty="0" smtClean="0"/>
-              <a:t>source</a:t>
-            </a:r>
-            <a:endParaRPr lang="en-US" i="1" dirty="0"/>
-          </a:p>
-        </p:txBody>
-      </p:sp>
-      <p:sp>
-        <p:nvSpPr>
-          <p:cNvPr id="86" name="TextBox 85"/>
-          <p:cNvSpPr txBox="1"/>
-          <p:nvPr/>
-        </p:nvSpPr>
-        <p:spPr>
-          <a:xfrm>
-            <a:off x="3744226" y="3440670"/>
-            <a:ext cx="854721" cy="646331"/>
-          </a:xfrm>
-          <a:prstGeom prst="rect">
-            <a:avLst/>
-          </a:prstGeom>
-          <a:noFill/>
-        </p:spPr>
-        <p:txBody>
-          <a:bodyPr wrap="none" rtlCol="0">
-            <a:spAutoFit/>
-          </a:bodyPr>
-          <a:lstStyle/>
-          <a:p>
-            <a:pPr algn="ctr"/>
-            <a:r>
-              <a:rPr lang="en-US" i="1" dirty="0" smtClean="0"/>
-              <a:t>pulsing</a:t>
-            </a:r>
-          </a:p>
-          <a:p>
-            <a:pPr algn="ctr"/>
-            <a:r>
-              <a:rPr lang="en-US" i="1" dirty="0" smtClean="0"/>
-              <a:t>plates</a:t>
-            </a:r>
-          </a:p>
-        </p:txBody>
-      </p:sp>
-      <p:sp>
-        <p:nvSpPr>
-          <p:cNvPr id="89" name="TextBox 88"/>
-          <p:cNvSpPr txBox="1"/>
-          <p:nvPr/>
-        </p:nvSpPr>
-        <p:spPr>
-          <a:xfrm>
-            <a:off x="4288739" y="2362202"/>
-            <a:ext cx="1110945" cy="646331"/>
-          </a:xfrm>
-          <a:prstGeom prst="rect">
-            <a:avLst/>
-          </a:prstGeom>
-          <a:noFill/>
-        </p:spPr>
-        <p:txBody>
-          <a:bodyPr wrap="none" rtlCol="0">
-            <a:spAutoFit/>
-          </a:bodyPr>
-          <a:lstStyle/>
-          <a:p>
-            <a:pPr algn="ctr"/>
-            <a:r>
-              <a:rPr lang="en-US" i="1" dirty="0"/>
-              <a:t>d</a:t>
-            </a:r>
-            <a:r>
-              <a:rPr lang="en-US" i="1" dirty="0" smtClean="0"/>
-              <a:t>eflection</a:t>
-            </a:r>
-          </a:p>
-          <a:p>
-            <a:pPr algn="ctr"/>
-            <a:r>
-              <a:rPr lang="en-US" i="1" dirty="0" smtClean="0"/>
-              <a:t>plates</a:t>
-            </a:r>
-          </a:p>
-        </p:txBody>
-      </p:sp>
-      <p:sp>
-        <p:nvSpPr>
-          <p:cNvPr id="98" name="TextBox 97"/>
-          <p:cNvSpPr txBox="1"/>
-          <p:nvPr/>
-        </p:nvSpPr>
-        <p:spPr>
-          <a:xfrm>
-            <a:off x="5219589" y="3516870"/>
-            <a:ext cx="1056701" cy="646331"/>
-          </a:xfrm>
-          <a:prstGeom prst="rect">
-            <a:avLst/>
-          </a:prstGeom>
-          <a:noFill/>
-        </p:spPr>
-        <p:txBody>
-          <a:bodyPr wrap="none" rtlCol="0">
-            <a:spAutoFit/>
-          </a:bodyPr>
-          <a:lstStyle/>
-          <a:p>
-            <a:pPr algn="ctr"/>
-            <a:r>
-              <a:rPr lang="en-US" i="1" dirty="0" smtClean="0"/>
-              <a:t>induction</a:t>
-            </a:r>
-          </a:p>
-          <a:p>
-            <a:pPr algn="ctr"/>
-            <a:r>
-              <a:rPr lang="en-US" i="1" dirty="0" smtClean="0"/>
-              <a:t>plates</a:t>
-            </a:r>
-          </a:p>
-        </p:txBody>
-      </p:sp>
-      <p:sp>
-        <p:nvSpPr>
-          <p:cNvPr id="99" name="TextBox 98"/>
-          <p:cNvSpPr txBox="1"/>
-          <p:nvPr/>
-        </p:nvSpPr>
-        <p:spPr>
-          <a:xfrm>
-            <a:off x="5817589" y="2401671"/>
-            <a:ext cx="942950" cy="646331"/>
-          </a:xfrm>
-          <a:prstGeom prst="rect">
-            <a:avLst/>
-          </a:prstGeom>
-          <a:noFill/>
-        </p:spPr>
-        <p:txBody>
-          <a:bodyPr wrap="none" rtlCol="0">
-            <a:spAutoFit/>
-          </a:bodyPr>
-          <a:lstStyle/>
-          <a:p>
-            <a:pPr algn="ctr"/>
-            <a:r>
-              <a:rPr lang="en-US" i="1" dirty="0" smtClean="0"/>
-              <a:t>Faraday</a:t>
-            </a:r>
-          </a:p>
-          <a:p>
-            <a:pPr algn="ctr"/>
-            <a:r>
-              <a:rPr lang="en-US" i="1" dirty="0" smtClean="0"/>
-              <a:t>cup</a:t>
-            </a:r>
-          </a:p>
-        </p:txBody>
-      </p:sp>
-      <p:sp>
-        <p:nvSpPr>
-          <p:cNvPr id="73" name="TextBox 72"/>
-          <p:cNvSpPr txBox="1"/>
-          <p:nvPr/>
-        </p:nvSpPr>
-        <p:spPr>
-          <a:xfrm>
-            <a:off x="6545326" y="3549134"/>
-            <a:ext cx="922497" cy="369332"/>
-          </a:xfrm>
-          <a:prstGeom prst="rect">
-            <a:avLst/>
-          </a:prstGeom>
-          <a:noFill/>
-        </p:spPr>
-        <p:txBody>
-          <a:bodyPr wrap="none" rtlCol="0">
-            <a:spAutoFit/>
-          </a:bodyPr>
-          <a:lstStyle/>
-          <a:p>
-            <a:pPr algn="ctr"/>
-            <a:r>
-              <a:rPr lang="en-US" i="1" dirty="0" smtClean="0"/>
-              <a:t>window</a:t>
-            </a:r>
-          </a:p>
-        </p:txBody>
-      </p:sp>
-      <p:sp>
-        <p:nvSpPr>
-          <p:cNvPr id="76" name="TextBox 75"/>
-          <p:cNvSpPr txBox="1"/>
-          <p:nvPr/>
-        </p:nvSpPr>
-        <p:spPr>
-          <a:xfrm>
-            <a:off x="1840049" y="3477657"/>
-            <a:ext cx="720005" cy="646331"/>
-          </a:xfrm>
-          <a:prstGeom prst="rect">
-            <a:avLst/>
-          </a:prstGeom>
-          <a:noFill/>
-        </p:spPr>
-        <p:txBody>
-          <a:bodyPr wrap="none" rtlCol="0">
-            <a:spAutoFit/>
-          </a:bodyPr>
-          <a:lstStyle/>
-          <a:p>
-            <a:pPr algn="ctr"/>
-            <a:r>
-              <a:rPr lang="en-US" i="1" dirty="0" smtClean="0"/>
-              <a:t>Einzel</a:t>
-            </a:r>
-          </a:p>
-          <a:p>
-            <a:pPr algn="ctr"/>
-            <a:r>
-              <a:rPr lang="en-US" i="1" dirty="0" smtClean="0"/>
-              <a:t>lens</a:t>
-            </a:r>
-            <a:endParaRPr lang="en-US" i="1" dirty="0"/>
-          </a:p>
-        </p:txBody>
-      </p:sp>
-      <p:sp>
-        <p:nvSpPr>
-          <p:cNvPr id="77" name="TextBox 76"/>
-          <p:cNvSpPr txBox="1"/>
-          <p:nvPr/>
-        </p:nvSpPr>
-        <p:spPr>
-          <a:xfrm>
-            <a:off x="2753129" y="2452510"/>
-            <a:ext cx="1346972" cy="646331"/>
-          </a:xfrm>
-          <a:prstGeom prst="rect">
-            <a:avLst/>
-          </a:prstGeom>
-          <a:noFill/>
-        </p:spPr>
-        <p:txBody>
-          <a:bodyPr wrap="none" rtlCol="0">
-            <a:spAutoFit/>
-          </a:bodyPr>
-          <a:lstStyle/>
-          <a:p>
-            <a:pPr algn="ctr"/>
-            <a:r>
-              <a:rPr lang="en-US" i="1" dirty="0" smtClean="0"/>
-              <a:t>decelerating</a:t>
-            </a:r>
-          </a:p>
-          <a:p>
-            <a:pPr algn="ctr"/>
-            <a:r>
-              <a:rPr lang="en-US" i="1" dirty="0" smtClean="0"/>
-              <a:t>lens</a:t>
-            </a:r>
-            <a:endParaRPr lang="en-US" i="1" dirty="0"/>
-          </a:p>
-        </p:txBody>
-      </p:sp>
-      <p:sp>
-        <p:nvSpPr>
-          <p:cNvPr id="96" name="TextBox 95"/>
-          <p:cNvSpPr txBox="1"/>
-          <p:nvPr/>
-        </p:nvSpPr>
-        <p:spPr>
-          <a:xfrm>
-            <a:off x="406701" y="3649334"/>
-            <a:ext cx="1330493" cy="646331"/>
-          </a:xfrm>
-          <a:prstGeom prst="rect">
-            <a:avLst/>
-          </a:prstGeom>
-          <a:noFill/>
-        </p:spPr>
-        <p:txBody>
-          <a:bodyPr wrap="none" rtlCol="0">
-            <a:spAutoFit/>
-          </a:bodyPr>
-          <a:lstStyle/>
-          <a:p>
-            <a:pPr algn="ctr"/>
-            <a:r>
-              <a:rPr lang="en-US" i="1" dirty="0" smtClean="0"/>
-              <a:t>accelerating</a:t>
-            </a:r>
-          </a:p>
-          <a:p>
-            <a:pPr algn="ctr"/>
-            <a:r>
-              <a:rPr lang="en-US" i="1" dirty="0" smtClean="0"/>
-              <a:t>lens</a:t>
-            </a:r>
-            <a:endParaRPr lang="en-US" i="1" dirty="0"/>
+            <a:endParaRPr lang="en-US"/>
           </a:p>
         </p:txBody>
       </p:sp>

</xml_diff>

<commit_message>
worked on ion beam fig
</commit_message>
<xml_diff>
--- a/figures/ionBeam.pptx
+++ b/figures/ionBeam.pptx
@@ -195,7 +195,7 @@
           <a:p>
             <a:fld id="{0E36CA7D-BEBA-4CC1-9F6A-AF2FC8A16C14}" type="datetimeFigureOut">
               <a:rPr lang="en-US" smtClean="0"/>
-              <a:t>8/5/2015</a:t>
+              <a:t>8/6/2015</a:t>
             </a:fld>
             <a:endParaRPr lang="en-US"/>
           </a:p>
@@ -822,7 +822,7 @@
           <a:p>
             <a:fld id="{132877A4-FC16-4741-A3F1-FD6FAA5C3825}" type="datetimeFigureOut">
               <a:rPr lang="en-US" smtClean="0"/>
-              <a:t>8/5/2015</a:t>
+              <a:t>8/6/2015</a:t>
             </a:fld>
             <a:endParaRPr lang="en-US"/>
           </a:p>
@@ -992,7 +992,7 @@
           <a:p>
             <a:fld id="{132877A4-FC16-4741-A3F1-FD6FAA5C3825}" type="datetimeFigureOut">
               <a:rPr lang="en-US" smtClean="0"/>
-              <a:t>8/5/2015</a:t>
+              <a:t>8/6/2015</a:t>
             </a:fld>
             <a:endParaRPr lang="en-US"/>
           </a:p>
@@ -1172,7 +1172,7 @@
           <a:p>
             <a:fld id="{132877A4-FC16-4741-A3F1-FD6FAA5C3825}" type="datetimeFigureOut">
               <a:rPr lang="en-US" smtClean="0"/>
-              <a:t>8/5/2015</a:t>
+              <a:t>8/6/2015</a:t>
             </a:fld>
             <a:endParaRPr lang="en-US"/>
           </a:p>
@@ -1342,7 +1342,7 @@
           <a:p>
             <a:fld id="{132877A4-FC16-4741-A3F1-FD6FAA5C3825}" type="datetimeFigureOut">
               <a:rPr lang="en-US" smtClean="0"/>
-              <a:t>8/5/2015</a:t>
+              <a:t>8/6/2015</a:t>
             </a:fld>
             <a:endParaRPr lang="en-US"/>
           </a:p>
@@ -1588,7 +1588,7 @@
           <a:p>
             <a:fld id="{132877A4-FC16-4741-A3F1-FD6FAA5C3825}" type="datetimeFigureOut">
               <a:rPr lang="en-US" smtClean="0"/>
-              <a:t>8/5/2015</a:t>
+              <a:t>8/6/2015</a:t>
             </a:fld>
             <a:endParaRPr lang="en-US"/>
           </a:p>
@@ -1876,7 +1876,7 @@
           <a:p>
             <a:fld id="{132877A4-FC16-4741-A3F1-FD6FAA5C3825}" type="datetimeFigureOut">
               <a:rPr lang="en-US" smtClean="0"/>
-              <a:t>8/5/2015</a:t>
+              <a:t>8/6/2015</a:t>
             </a:fld>
             <a:endParaRPr lang="en-US"/>
           </a:p>
@@ -2298,7 +2298,7 @@
           <a:p>
             <a:fld id="{132877A4-FC16-4741-A3F1-FD6FAA5C3825}" type="datetimeFigureOut">
               <a:rPr lang="en-US" smtClean="0"/>
-              <a:t>8/5/2015</a:t>
+              <a:t>8/6/2015</a:t>
             </a:fld>
             <a:endParaRPr lang="en-US"/>
           </a:p>
@@ -2416,7 +2416,7 @@
           <a:p>
             <a:fld id="{132877A4-FC16-4741-A3F1-FD6FAA5C3825}" type="datetimeFigureOut">
               <a:rPr lang="en-US" smtClean="0"/>
-              <a:t>8/5/2015</a:t>
+              <a:t>8/6/2015</a:t>
             </a:fld>
             <a:endParaRPr lang="en-US"/>
           </a:p>
@@ -2511,7 +2511,7 @@
           <a:p>
             <a:fld id="{132877A4-FC16-4741-A3F1-FD6FAA5C3825}" type="datetimeFigureOut">
               <a:rPr lang="en-US" smtClean="0"/>
-              <a:t>8/5/2015</a:t>
+              <a:t>8/6/2015</a:t>
             </a:fld>
             <a:endParaRPr lang="en-US"/>
           </a:p>
@@ -2788,7 +2788,7 @@
           <a:p>
             <a:fld id="{132877A4-FC16-4741-A3F1-FD6FAA5C3825}" type="datetimeFigureOut">
               <a:rPr lang="en-US" smtClean="0"/>
-              <a:t>8/5/2015</a:t>
+              <a:t>8/6/2015</a:t>
             </a:fld>
             <a:endParaRPr lang="en-US"/>
           </a:p>
@@ -3041,7 +3041,7 @@
           <a:p>
             <a:fld id="{132877A4-FC16-4741-A3F1-FD6FAA5C3825}" type="datetimeFigureOut">
               <a:rPr lang="en-US" smtClean="0"/>
-              <a:t>8/5/2015</a:t>
+              <a:t>8/6/2015</a:t>
             </a:fld>
             <a:endParaRPr lang="en-US"/>
           </a:p>
@@ -3254,7 +3254,7 @@
           <a:p>
             <a:fld id="{132877A4-FC16-4741-A3F1-FD6FAA5C3825}" type="datetimeFigureOut">
               <a:rPr lang="en-US" smtClean="0"/>
-              <a:t>8/5/2015</a:t>
+              <a:t>8/6/2015</a:t>
             </a:fld>
             <a:endParaRPr lang="en-US"/>
           </a:p>
@@ -7858,9 +7858,12 @@
               <a:lumMod val="65000"/>
             </a:schemeClr>
           </a:solidFill>
-          <a:ln>
-            <a:solidFill>
-              <a:schemeClr val="tx1"/>
+          <a:ln w="19050">
+            <a:solidFill>
+              <a:schemeClr val="tx1">
+                <a:lumMod val="75000"/>
+                <a:lumOff val="25000"/>
+              </a:schemeClr>
             </a:solidFill>
           </a:ln>
         </p:spPr>

</xml_diff>

<commit_message>
workin on citations for 1
</commit_message>
<xml_diff>
--- a/figures/ionBeam.pptx
+++ b/figures/ionBeam.pptx
@@ -5,13 +5,14 @@
     <p:sldMasterId id="2147483648" r:id="rId1"/>
   </p:sldMasterIdLst>
   <p:notesMasterIdLst>
-    <p:notesMasterId r:id="rId6"/>
+    <p:notesMasterId r:id="rId7"/>
   </p:notesMasterIdLst>
   <p:sldIdLst>
     <p:sldId id="257" r:id="rId2"/>
     <p:sldId id="258" r:id="rId3"/>
     <p:sldId id="259" r:id="rId4"/>
     <p:sldId id="260" r:id="rId5"/>
+    <p:sldId id="261" r:id="rId6"/>
   </p:sldIdLst>
   <p:sldSz cx="9144000" cy="6858000" type="screen4x3"/>
   <p:notesSz cx="6858000" cy="9144000"/>
@@ -195,7 +196,7 @@
           <a:p>
             <a:fld id="{0E36CA7D-BEBA-4CC1-9F6A-AF2FC8A16C14}" type="datetimeFigureOut">
               <a:rPr lang="en-US" smtClean="0"/>
-              <a:t>8/6/2015</a:t>
+              <a:t>8/10/2015</a:t>
             </a:fld>
             <a:endParaRPr lang="en-US"/>
           </a:p>
@@ -822,7 +823,7 @@
           <a:p>
             <a:fld id="{132877A4-FC16-4741-A3F1-FD6FAA5C3825}" type="datetimeFigureOut">
               <a:rPr lang="en-US" smtClean="0"/>
-              <a:t>8/6/2015</a:t>
+              <a:t>8/10/2015</a:t>
             </a:fld>
             <a:endParaRPr lang="en-US"/>
           </a:p>
@@ -992,7 +993,7 @@
           <a:p>
             <a:fld id="{132877A4-FC16-4741-A3F1-FD6FAA5C3825}" type="datetimeFigureOut">
               <a:rPr lang="en-US" smtClean="0"/>
-              <a:t>8/6/2015</a:t>
+              <a:t>8/10/2015</a:t>
             </a:fld>
             <a:endParaRPr lang="en-US"/>
           </a:p>
@@ -1172,7 +1173,7 @@
           <a:p>
             <a:fld id="{132877A4-FC16-4741-A3F1-FD6FAA5C3825}" type="datetimeFigureOut">
               <a:rPr lang="en-US" smtClean="0"/>
-              <a:t>8/6/2015</a:t>
+              <a:t>8/10/2015</a:t>
             </a:fld>
             <a:endParaRPr lang="en-US"/>
           </a:p>
@@ -1342,7 +1343,7 @@
           <a:p>
             <a:fld id="{132877A4-FC16-4741-A3F1-FD6FAA5C3825}" type="datetimeFigureOut">
               <a:rPr lang="en-US" smtClean="0"/>
-              <a:t>8/6/2015</a:t>
+              <a:t>8/10/2015</a:t>
             </a:fld>
             <a:endParaRPr lang="en-US"/>
           </a:p>
@@ -1588,7 +1589,7 @@
           <a:p>
             <a:fld id="{132877A4-FC16-4741-A3F1-FD6FAA5C3825}" type="datetimeFigureOut">
               <a:rPr lang="en-US" smtClean="0"/>
-              <a:t>8/6/2015</a:t>
+              <a:t>8/10/2015</a:t>
             </a:fld>
             <a:endParaRPr lang="en-US"/>
           </a:p>
@@ -1876,7 +1877,7 @@
           <a:p>
             <a:fld id="{132877A4-FC16-4741-A3F1-FD6FAA5C3825}" type="datetimeFigureOut">
               <a:rPr lang="en-US" smtClean="0"/>
-              <a:t>8/6/2015</a:t>
+              <a:t>8/10/2015</a:t>
             </a:fld>
             <a:endParaRPr lang="en-US"/>
           </a:p>
@@ -2298,7 +2299,7 @@
           <a:p>
             <a:fld id="{132877A4-FC16-4741-A3F1-FD6FAA5C3825}" type="datetimeFigureOut">
               <a:rPr lang="en-US" smtClean="0"/>
-              <a:t>8/6/2015</a:t>
+              <a:t>8/10/2015</a:t>
             </a:fld>
             <a:endParaRPr lang="en-US"/>
           </a:p>
@@ -2416,7 +2417,7 @@
           <a:p>
             <a:fld id="{132877A4-FC16-4741-A3F1-FD6FAA5C3825}" type="datetimeFigureOut">
               <a:rPr lang="en-US" smtClean="0"/>
-              <a:t>8/6/2015</a:t>
+              <a:t>8/10/2015</a:t>
             </a:fld>
             <a:endParaRPr lang="en-US"/>
           </a:p>
@@ -2511,7 +2512,7 @@
           <a:p>
             <a:fld id="{132877A4-FC16-4741-A3F1-FD6FAA5C3825}" type="datetimeFigureOut">
               <a:rPr lang="en-US" smtClean="0"/>
-              <a:t>8/6/2015</a:t>
+              <a:t>8/10/2015</a:t>
             </a:fld>
             <a:endParaRPr lang="en-US"/>
           </a:p>
@@ -2788,7 +2789,7 @@
           <a:p>
             <a:fld id="{132877A4-FC16-4741-A3F1-FD6FAA5C3825}" type="datetimeFigureOut">
               <a:rPr lang="en-US" smtClean="0"/>
-              <a:t>8/6/2015</a:t>
+              <a:t>8/10/2015</a:t>
             </a:fld>
             <a:endParaRPr lang="en-US"/>
           </a:p>
@@ -3041,7 +3042,7 @@
           <a:p>
             <a:fld id="{132877A4-FC16-4741-A3F1-FD6FAA5C3825}" type="datetimeFigureOut">
               <a:rPr lang="en-US" smtClean="0"/>
-              <a:t>8/6/2015</a:t>
+              <a:t>8/10/2015</a:t>
             </a:fld>
             <a:endParaRPr lang="en-US"/>
           </a:p>
@@ -3254,7 +3255,7 @@
           <a:p>
             <a:fld id="{132877A4-FC16-4741-A3F1-FD6FAA5C3825}" type="datetimeFigureOut">
               <a:rPr lang="en-US" smtClean="0"/>
-              <a:t>8/6/2015</a:t>
+              <a:t>8/10/2015</a:t>
             </a:fld>
             <a:endParaRPr lang="en-US"/>
           </a:p>
@@ -12951,6 +12952,1821 @@
     <p:extLst>
       <p:ext uri="{BB962C8B-B14F-4D97-AF65-F5344CB8AC3E}">
         <p14:creationId xmlns:p14="http://schemas.microsoft.com/office/powerpoint/2010/main" val="1998776290"/>
+      </p:ext>
+    </p:extLst>
+  </p:cSld>
+  <p:clrMapOvr>
+    <a:masterClrMapping/>
+  </p:clrMapOvr>
+  <p:timing>
+    <p:tnLst>
+      <p:par>
+        <p:cTn id="1" dur="indefinite" restart="never" nodeType="tmRoot"/>
+      </p:par>
+    </p:tnLst>
+  </p:timing>
+</p:sld>
+</file>
+
+<file path=ppt/slides/slide5.xml><?xml version="1.0" encoding="utf-8"?>
+<p:sld xmlns:a="http://schemas.openxmlformats.org/drawingml/2006/main" xmlns:r="http://schemas.openxmlformats.org/officeDocument/2006/relationships" xmlns:p="http://schemas.openxmlformats.org/presentationml/2006/main">
+  <p:cSld>
+    <p:spTree>
+      <p:nvGrpSpPr>
+        <p:cNvPr id="1" name=""/>
+        <p:cNvGrpSpPr/>
+        <p:nvPr/>
+      </p:nvGrpSpPr>
+      <p:grpSpPr>
+        <a:xfrm>
+          <a:off x="0" y="0"/>
+          <a:ext cx="0" cy="0"/>
+          <a:chOff x="0" y="0"/>
+          <a:chExt cx="0" cy="0"/>
+        </a:xfrm>
+      </p:grpSpPr>
+      <p:sp>
+        <p:nvSpPr>
+          <p:cNvPr id="2" name="Slide Number Placeholder 1"/>
+          <p:cNvSpPr>
+            <a:spLocks noGrp="1"/>
+          </p:cNvSpPr>
+          <p:nvPr>
+            <p:ph type="sldNum" sz="quarter" idx="12"/>
+          </p:nvPr>
+        </p:nvSpPr>
+        <p:spPr/>
+        <p:txBody>
+          <a:bodyPr/>
+          <a:lstStyle/>
+          <a:p>
+            <a:fld id="{66B1EE22-C4C2-482C-B3A9-AFE3A9744799}" type="slidenum">
+              <a:rPr lang="en-US" smtClean="0"/>
+              <a:t>5</a:t>
+            </a:fld>
+            <a:endParaRPr lang="en-US"/>
+          </a:p>
+        </p:txBody>
+      </p:sp>
+      <p:sp>
+        <p:nvSpPr>
+          <p:cNvPr id="3" name="TextBox 2"/>
+          <p:cNvSpPr txBox="1"/>
+          <p:nvPr/>
+        </p:nvSpPr>
+        <p:spPr>
+          <a:xfrm>
+            <a:off x="1345297" y="76200"/>
+            <a:ext cx="6563207" cy="646331"/>
+          </a:xfrm>
+          <a:prstGeom prst="rect">
+            <a:avLst/>
+          </a:prstGeom>
+          <a:noFill/>
+        </p:spPr>
+        <p:txBody>
+          <a:bodyPr wrap="none" rtlCol="0">
+            <a:spAutoFit/>
+          </a:bodyPr>
+          <a:lstStyle/>
+          <a:p>
+            <a:pPr algn="ctr"/>
+            <a:r>
+              <a:rPr lang="en-US" sz="3600" b="1" dirty="0" smtClean="0"/>
+              <a:t>E x B Mass Filter for selecting Ba</a:t>
+            </a:r>
+            <a:r>
+              <a:rPr lang="en-US" sz="3600" b="1" baseline="30000" dirty="0" smtClean="0"/>
+              <a:t>+</a:t>
+            </a:r>
+            <a:endParaRPr lang="en-US" sz="3600" b="1" baseline="30000" dirty="0" smtClean="0">
+              <a:solidFill>
+                <a:srgbClr val="0000CC"/>
+              </a:solidFill>
+            </a:endParaRPr>
+          </a:p>
+        </p:txBody>
+      </p:sp>
+      <p:sp>
+        <p:nvSpPr>
+          <p:cNvPr id="5" name="Rectangle 4"/>
+          <p:cNvSpPr/>
+          <p:nvPr/>
+        </p:nvSpPr>
+        <p:spPr>
+          <a:xfrm>
+            <a:off x="2715923" y="2907581"/>
+            <a:ext cx="304800" cy="1142998"/>
+          </a:xfrm>
+          <a:prstGeom prst="rect">
+            <a:avLst/>
+          </a:prstGeom>
+          <a:solidFill>
+            <a:schemeClr val="bg1">
+              <a:lumMod val="75000"/>
+            </a:schemeClr>
+          </a:solidFill>
+          <a:ln>
+            <a:solidFill>
+              <a:schemeClr val="bg1">
+                <a:lumMod val="65000"/>
+              </a:schemeClr>
+            </a:solidFill>
+          </a:ln>
+        </p:spPr>
+        <p:style>
+          <a:lnRef idx="2">
+            <a:schemeClr val="accent1">
+              <a:shade val="50000"/>
+            </a:schemeClr>
+          </a:lnRef>
+          <a:fillRef idx="1">
+            <a:schemeClr val="accent1"/>
+          </a:fillRef>
+          <a:effectRef idx="0">
+            <a:schemeClr val="accent1"/>
+          </a:effectRef>
+          <a:fontRef idx="minor">
+            <a:schemeClr val="lt1"/>
+          </a:fontRef>
+        </p:style>
+        <p:txBody>
+          <a:bodyPr rtlCol="0" anchor="ctr"/>
+          <a:lstStyle/>
+          <a:p>
+            <a:pPr algn="ctr"/>
+            <a:endParaRPr lang="en-US"/>
+          </a:p>
+        </p:txBody>
+      </p:sp>
+      <p:sp>
+        <p:nvSpPr>
+          <p:cNvPr id="6" name="Rectangle 5"/>
+          <p:cNvSpPr/>
+          <p:nvPr/>
+        </p:nvSpPr>
+        <p:spPr>
+          <a:xfrm>
+            <a:off x="5012809" y="2907581"/>
+            <a:ext cx="304800" cy="1142998"/>
+          </a:xfrm>
+          <a:prstGeom prst="rect">
+            <a:avLst/>
+          </a:prstGeom>
+          <a:solidFill>
+            <a:schemeClr val="bg1">
+              <a:lumMod val="75000"/>
+            </a:schemeClr>
+          </a:solidFill>
+          <a:ln>
+            <a:solidFill>
+              <a:schemeClr val="bg1">
+                <a:lumMod val="65000"/>
+              </a:schemeClr>
+            </a:solidFill>
+          </a:ln>
+        </p:spPr>
+        <p:style>
+          <a:lnRef idx="2">
+            <a:schemeClr val="accent1">
+              <a:shade val="50000"/>
+            </a:schemeClr>
+          </a:lnRef>
+          <a:fillRef idx="1">
+            <a:schemeClr val="accent1"/>
+          </a:fillRef>
+          <a:effectRef idx="0">
+            <a:schemeClr val="accent1"/>
+          </a:effectRef>
+          <a:fontRef idx="minor">
+            <a:schemeClr val="lt1"/>
+          </a:fontRef>
+        </p:style>
+        <p:txBody>
+          <a:bodyPr rtlCol="0" anchor="ctr"/>
+          <a:lstStyle/>
+          <a:p>
+            <a:pPr algn="ctr"/>
+            <a:endParaRPr lang="en-US"/>
+          </a:p>
+        </p:txBody>
+      </p:sp>
+      <p:sp>
+        <p:nvSpPr>
+          <p:cNvPr id="7" name="Rectangle 6"/>
+          <p:cNvSpPr/>
+          <p:nvPr/>
+        </p:nvSpPr>
+        <p:spPr>
+          <a:xfrm flipV="1">
+            <a:off x="2715923" y="2796547"/>
+            <a:ext cx="592101" cy="45719"/>
+          </a:xfrm>
+          <a:prstGeom prst="rect">
+            <a:avLst/>
+          </a:prstGeom>
+          <a:solidFill>
+            <a:schemeClr val="bg1">
+              <a:lumMod val="75000"/>
+            </a:schemeClr>
+          </a:solidFill>
+          <a:ln>
+            <a:solidFill>
+              <a:schemeClr val="bg1">
+                <a:lumMod val="65000"/>
+              </a:schemeClr>
+            </a:solidFill>
+          </a:ln>
+        </p:spPr>
+        <p:style>
+          <a:lnRef idx="2">
+            <a:schemeClr val="accent1">
+              <a:shade val="50000"/>
+            </a:schemeClr>
+          </a:lnRef>
+          <a:fillRef idx="1">
+            <a:schemeClr val="accent1"/>
+          </a:fillRef>
+          <a:effectRef idx="0">
+            <a:schemeClr val="accent1"/>
+          </a:effectRef>
+          <a:fontRef idx="minor">
+            <a:schemeClr val="lt1"/>
+          </a:fontRef>
+        </p:style>
+        <p:txBody>
+          <a:bodyPr rtlCol="0" anchor="ctr"/>
+          <a:lstStyle/>
+          <a:p>
+            <a:pPr algn="ctr"/>
+            <a:endParaRPr lang="en-US"/>
+          </a:p>
+        </p:txBody>
+      </p:sp>
+      <p:sp>
+        <p:nvSpPr>
+          <p:cNvPr id="8" name="Rectangle 7"/>
+          <p:cNvSpPr/>
+          <p:nvPr/>
+        </p:nvSpPr>
+        <p:spPr>
+          <a:xfrm flipV="1">
+            <a:off x="4725508" y="2796547"/>
+            <a:ext cx="592101" cy="45719"/>
+          </a:xfrm>
+          <a:prstGeom prst="rect">
+            <a:avLst/>
+          </a:prstGeom>
+          <a:solidFill>
+            <a:schemeClr val="bg1">
+              <a:lumMod val="75000"/>
+            </a:schemeClr>
+          </a:solidFill>
+          <a:ln>
+            <a:solidFill>
+              <a:schemeClr val="bg1">
+                <a:lumMod val="65000"/>
+              </a:schemeClr>
+            </a:solidFill>
+          </a:ln>
+        </p:spPr>
+        <p:style>
+          <a:lnRef idx="2">
+            <a:schemeClr val="accent1">
+              <a:shade val="50000"/>
+            </a:schemeClr>
+          </a:lnRef>
+          <a:fillRef idx="1">
+            <a:schemeClr val="accent1"/>
+          </a:fillRef>
+          <a:effectRef idx="0">
+            <a:schemeClr val="accent1"/>
+          </a:effectRef>
+          <a:fontRef idx="minor">
+            <a:schemeClr val="lt1"/>
+          </a:fontRef>
+        </p:style>
+        <p:txBody>
+          <a:bodyPr rtlCol="0" anchor="ctr"/>
+          <a:lstStyle/>
+          <a:p>
+            <a:pPr algn="ctr"/>
+            <a:endParaRPr lang="en-US"/>
+          </a:p>
+        </p:txBody>
+      </p:sp>
+      <p:sp>
+        <p:nvSpPr>
+          <p:cNvPr id="9" name="Rectangle 8"/>
+          <p:cNvSpPr/>
+          <p:nvPr/>
+        </p:nvSpPr>
+        <p:spPr>
+          <a:xfrm flipV="1">
+            <a:off x="2715923" y="2678980"/>
+            <a:ext cx="838200" cy="45719"/>
+          </a:xfrm>
+          <a:prstGeom prst="rect">
+            <a:avLst/>
+          </a:prstGeom>
+          <a:solidFill>
+            <a:schemeClr val="bg1">
+              <a:lumMod val="75000"/>
+            </a:schemeClr>
+          </a:solidFill>
+          <a:ln>
+            <a:solidFill>
+              <a:schemeClr val="bg1">
+                <a:lumMod val="65000"/>
+              </a:schemeClr>
+            </a:solidFill>
+          </a:ln>
+        </p:spPr>
+        <p:style>
+          <a:lnRef idx="2">
+            <a:schemeClr val="accent1">
+              <a:shade val="50000"/>
+            </a:schemeClr>
+          </a:lnRef>
+          <a:fillRef idx="1">
+            <a:schemeClr val="accent1"/>
+          </a:fillRef>
+          <a:effectRef idx="0">
+            <a:schemeClr val="accent1"/>
+          </a:effectRef>
+          <a:fontRef idx="minor">
+            <a:schemeClr val="lt1"/>
+          </a:fontRef>
+        </p:style>
+        <p:txBody>
+          <a:bodyPr rtlCol="0" anchor="ctr"/>
+          <a:lstStyle/>
+          <a:p>
+            <a:pPr algn="ctr"/>
+            <a:endParaRPr lang="en-US"/>
+          </a:p>
+        </p:txBody>
+      </p:sp>
+      <p:sp>
+        <p:nvSpPr>
+          <p:cNvPr id="11" name="Rectangle 10"/>
+          <p:cNvSpPr/>
+          <p:nvPr/>
+        </p:nvSpPr>
+        <p:spPr>
+          <a:xfrm flipV="1">
+            <a:off x="4479409" y="2678980"/>
+            <a:ext cx="838200" cy="45719"/>
+          </a:xfrm>
+          <a:prstGeom prst="rect">
+            <a:avLst/>
+          </a:prstGeom>
+          <a:solidFill>
+            <a:schemeClr val="bg1">
+              <a:lumMod val="75000"/>
+            </a:schemeClr>
+          </a:solidFill>
+          <a:ln>
+            <a:solidFill>
+              <a:schemeClr val="bg1">
+                <a:lumMod val="65000"/>
+              </a:schemeClr>
+            </a:solidFill>
+          </a:ln>
+        </p:spPr>
+        <p:style>
+          <a:lnRef idx="2">
+            <a:schemeClr val="accent1">
+              <a:shade val="50000"/>
+            </a:schemeClr>
+          </a:lnRef>
+          <a:fillRef idx="1">
+            <a:schemeClr val="accent1"/>
+          </a:fillRef>
+          <a:effectRef idx="0">
+            <a:schemeClr val="accent1"/>
+          </a:effectRef>
+          <a:fontRef idx="minor">
+            <a:schemeClr val="lt1"/>
+          </a:fontRef>
+        </p:style>
+        <p:txBody>
+          <a:bodyPr rtlCol="0" anchor="ctr"/>
+          <a:lstStyle/>
+          <a:p>
+            <a:pPr algn="ctr"/>
+            <a:endParaRPr lang="en-US"/>
+          </a:p>
+        </p:txBody>
+      </p:sp>
+      <p:sp>
+        <p:nvSpPr>
+          <p:cNvPr id="12" name="Rectangle 11"/>
+          <p:cNvSpPr/>
+          <p:nvPr/>
+        </p:nvSpPr>
+        <p:spPr>
+          <a:xfrm flipV="1">
+            <a:off x="2715923" y="2549438"/>
+            <a:ext cx="1066800" cy="45719"/>
+          </a:xfrm>
+          <a:prstGeom prst="rect">
+            <a:avLst/>
+          </a:prstGeom>
+          <a:solidFill>
+            <a:schemeClr val="bg1">
+              <a:lumMod val="75000"/>
+            </a:schemeClr>
+          </a:solidFill>
+          <a:ln>
+            <a:solidFill>
+              <a:schemeClr val="bg1">
+                <a:lumMod val="65000"/>
+              </a:schemeClr>
+            </a:solidFill>
+          </a:ln>
+        </p:spPr>
+        <p:style>
+          <a:lnRef idx="2">
+            <a:schemeClr val="accent1">
+              <a:shade val="50000"/>
+            </a:schemeClr>
+          </a:lnRef>
+          <a:fillRef idx="1">
+            <a:schemeClr val="accent1"/>
+          </a:fillRef>
+          <a:effectRef idx="0">
+            <a:schemeClr val="accent1"/>
+          </a:effectRef>
+          <a:fontRef idx="minor">
+            <a:schemeClr val="lt1"/>
+          </a:fontRef>
+        </p:style>
+        <p:txBody>
+          <a:bodyPr rtlCol="0" anchor="ctr"/>
+          <a:lstStyle/>
+          <a:p>
+            <a:pPr algn="ctr"/>
+            <a:endParaRPr lang="en-US"/>
+          </a:p>
+        </p:txBody>
+      </p:sp>
+      <p:sp>
+        <p:nvSpPr>
+          <p:cNvPr id="13" name="Rectangle 12"/>
+          <p:cNvSpPr/>
+          <p:nvPr/>
+        </p:nvSpPr>
+        <p:spPr>
+          <a:xfrm flipV="1">
+            <a:off x="4250809" y="2549438"/>
+            <a:ext cx="1066800" cy="45719"/>
+          </a:xfrm>
+          <a:prstGeom prst="rect">
+            <a:avLst/>
+          </a:prstGeom>
+          <a:solidFill>
+            <a:schemeClr val="bg1">
+              <a:lumMod val="75000"/>
+            </a:schemeClr>
+          </a:solidFill>
+          <a:ln>
+            <a:solidFill>
+              <a:schemeClr val="bg1">
+                <a:lumMod val="65000"/>
+              </a:schemeClr>
+            </a:solidFill>
+          </a:ln>
+        </p:spPr>
+        <p:style>
+          <a:lnRef idx="2">
+            <a:schemeClr val="accent1">
+              <a:shade val="50000"/>
+            </a:schemeClr>
+          </a:lnRef>
+          <a:fillRef idx="1">
+            <a:schemeClr val="accent1"/>
+          </a:fillRef>
+          <a:effectRef idx="0">
+            <a:schemeClr val="accent1"/>
+          </a:effectRef>
+          <a:fontRef idx="minor">
+            <a:schemeClr val="lt1"/>
+          </a:fontRef>
+        </p:style>
+        <p:txBody>
+          <a:bodyPr rtlCol="0" anchor="ctr"/>
+          <a:lstStyle/>
+          <a:p>
+            <a:pPr algn="ctr"/>
+            <a:endParaRPr lang="en-US"/>
+          </a:p>
+        </p:txBody>
+      </p:sp>
+      <p:sp>
+        <p:nvSpPr>
+          <p:cNvPr id="16" name="Rectangle 15"/>
+          <p:cNvSpPr/>
+          <p:nvPr/>
+        </p:nvSpPr>
+        <p:spPr>
+          <a:xfrm flipV="1">
+            <a:off x="2715923" y="2419898"/>
+            <a:ext cx="2601686" cy="45719"/>
+          </a:xfrm>
+          <a:prstGeom prst="rect">
+            <a:avLst/>
+          </a:prstGeom>
+          <a:solidFill>
+            <a:schemeClr val="bg1">
+              <a:lumMod val="75000"/>
+            </a:schemeClr>
+          </a:solidFill>
+          <a:ln>
+            <a:solidFill>
+              <a:schemeClr val="bg1">
+                <a:lumMod val="65000"/>
+              </a:schemeClr>
+            </a:solidFill>
+          </a:ln>
+        </p:spPr>
+        <p:style>
+          <a:lnRef idx="2">
+            <a:schemeClr val="accent1">
+              <a:shade val="50000"/>
+            </a:schemeClr>
+          </a:lnRef>
+          <a:fillRef idx="1">
+            <a:schemeClr val="accent1"/>
+          </a:fillRef>
+          <a:effectRef idx="0">
+            <a:schemeClr val="accent1"/>
+          </a:effectRef>
+          <a:fontRef idx="minor">
+            <a:schemeClr val="lt1"/>
+          </a:fontRef>
+        </p:style>
+        <p:txBody>
+          <a:bodyPr rtlCol="0" anchor="ctr"/>
+          <a:lstStyle/>
+          <a:p>
+            <a:pPr algn="ctr"/>
+            <a:endParaRPr lang="en-US"/>
+          </a:p>
+        </p:txBody>
+      </p:sp>
+      <p:sp>
+        <p:nvSpPr>
+          <p:cNvPr id="24" name="Rectangle 23"/>
+          <p:cNvSpPr/>
+          <p:nvPr/>
+        </p:nvSpPr>
+        <p:spPr>
+          <a:xfrm flipV="1">
+            <a:off x="2711545" y="4126781"/>
+            <a:ext cx="592101" cy="45719"/>
+          </a:xfrm>
+          <a:prstGeom prst="rect">
+            <a:avLst/>
+          </a:prstGeom>
+          <a:solidFill>
+            <a:schemeClr val="bg1">
+              <a:lumMod val="75000"/>
+            </a:schemeClr>
+          </a:solidFill>
+          <a:ln>
+            <a:solidFill>
+              <a:schemeClr val="bg1">
+                <a:lumMod val="65000"/>
+              </a:schemeClr>
+            </a:solidFill>
+          </a:ln>
+        </p:spPr>
+        <p:style>
+          <a:lnRef idx="2">
+            <a:schemeClr val="accent1">
+              <a:shade val="50000"/>
+            </a:schemeClr>
+          </a:lnRef>
+          <a:fillRef idx="1">
+            <a:schemeClr val="accent1"/>
+          </a:fillRef>
+          <a:effectRef idx="0">
+            <a:schemeClr val="accent1"/>
+          </a:effectRef>
+          <a:fontRef idx="minor">
+            <a:schemeClr val="lt1"/>
+          </a:fontRef>
+        </p:style>
+        <p:txBody>
+          <a:bodyPr rtlCol="0" anchor="ctr"/>
+          <a:lstStyle/>
+          <a:p>
+            <a:pPr algn="ctr"/>
+            <a:endParaRPr lang="en-US"/>
+          </a:p>
+        </p:txBody>
+      </p:sp>
+      <p:sp>
+        <p:nvSpPr>
+          <p:cNvPr id="25" name="Rectangle 24"/>
+          <p:cNvSpPr/>
+          <p:nvPr/>
+        </p:nvSpPr>
+        <p:spPr>
+          <a:xfrm flipV="1">
+            <a:off x="4721130" y="4126781"/>
+            <a:ext cx="592101" cy="45719"/>
+          </a:xfrm>
+          <a:prstGeom prst="rect">
+            <a:avLst/>
+          </a:prstGeom>
+          <a:solidFill>
+            <a:schemeClr val="bg1">
+              <a:lumMod val="75000"/>
+            </a:schemeClr>
+          </a:solidFill>
+          <a:ln>
+            <a:solidFill>
+              <a:schemeClr val="bg1">
+                <a:lumMod val="65000"/>
+              </a:schemeClr>
+            </a:solidFill>
+          </a:ln>
+        </p:spPr>
+        <p:style>
+          <a:lnRef idx="2">
+            <a:schemeClr val="accent1">
+              <a:shade val="50000"/>
+            </a:schemeClr>
+          </a:lnRef>
+          <a:fillRef idx="1">
+            <a:schemeClr val="accent1"/>
+          </a:fillRef>
+          <a:effectRef idx="0">
+            <a:schemeClr val="accent1"/>
+          </a:effectRef>
+          <a:fontRef idx="minor">
+            <a:schemeClr val="lt1"/>
+          </a:fontRef>
+        </p:style>
+        <p:txBody>
+          <a:bodyPr rtlCol="0" anchor="ctr"/>
+          <a:lstStyle/>
+          <a:p>
+            <a:pPr algn="ctr"/>
+            <a:endParaRPr lang="en-US"/>
+          </a:p>
+        </p:txBody>
+      </p:sp>
+      <p:sp>
+        <p:nvSpPr>
+          <p:cNvPr id="26" name="Rectangle 25"/>
+          <p:cNvSpPr/>
+          <p:nvPr/>
+        </p:nvSpPr>
+        <p:spPr>
+          <a:xfrm flipV="1">
+            <a:off x="2711545" y="4233462"/>
+            <a:ext cx="838200" cy="45719"/>
+          </a:xfrm>
+          <a:prstGeom prst="rect">
+            <a:avLst/>
+          </a:prstGeom>
+          <a:solidFill>
+            <a:schemeClr val="bg1">
+              <a:lumMod val="75000"/>
+            </a:schemeClr>
+          </a:solidFill>
+          <a:ln>
+            <a:solidFill>
+              <a:schemeClr val="bg1">
+                <a:lumMod val="65000"/>
+              </a:schemeClr>
+            </a:solidFill>
+          </a:ln>
+        </p:spPr>
+        <p:style>
+          <a:lnRef idx="2">
+            <a:schemeClr val="accent1">
+              <a:shade val="50000"/>
+            </a:schemeClr>
+          </a:lnRef>
+          <a:fillRef idx="1">
+            <a:schemeClr val="accent1"/>
+          </a:fillRef>
+          <a:effectRef idx="0">
+            <a:schemeClr val="accent1"/>
+          </a:effectRef>
+          <a:fontRef idx="minor">
+            <a:schemeClr val="lt1"/>
+          </a:fontRef>
+        </p:style>
+        <p:txBody>
+          <a:bodyPr rtlCol="0" anchor="ctr"/>
+          <a:lstStyle/>
+          <a:p>
+            <a:pPr algn="ctr"/>
+            <a:endParaRPr lang="en-US"/>
+          </a:p>
+        </p:txBody>
+      </p:sp>
+      <p:sp>
+        <p:nvSpPr>
+          <p:cNvPr id="27" name="Rectangle 26"/>
+          <p:cNvSpPr/>
+          <p:nvPr/>
+        </p:nvSpPr>
+        <p:spPr>
+          <a:xfrm flipV="1">
+            <a:off x="4475031" y="4233462"/>
+            <a:ext cx="838200" cy="45719"/>
+          </a:xfrm>
+          <a:prstGeom prst="rect">
+            <a:avLst/>
+          </a:prstGeom>
+          <a:solidFill>
+            <a:schemeClr val="bg1">
+              <a:lumMod val="75000"/>
+            </a:schemeClr>
+          </a:solidFill>
+          <a:ln>
+            <a:solidFill>
+              <a:schemeClr val="bg1">
+                <a:lumMod val="65000"/>
+              </a:schemeClr>
+            </a:solidFill>
+          </a:ln>
+        </p:spPr>
+        <p:style>
+          <a:lnRef idx="2">
+            <a:schemeClr val="accent1">
+              <a:shade val="50000"/>
+            </a:schemeClr>
+          </a:lnRef>
+          <a:fillRef idx="1">
+            <a:schemeClr val="accent1"/>
+          </a:fillRef>
+          <a:effectRef idx="0">
+            <a:schemeClr val="accent1"/>
+          </a:effectRef>
+          <a:fontRef idx="minor">
+            <a:schemeClr val="lt1"/>
+          </a:fontRef>
+        </p:style>
+        <p:txBody>
+          <a:bodyPr rtlCol="0" anchor="ctr"/>
+          <a:lstStyle/>
+          <a:p>
+            <a:pPr algn="ctr"/>
+            <a:endParaRPr lang="en-US"/>
+          </a:p>
+        </p:txBody>
+      </p:sp>
+      <p:sp>
+        <p:nvSpPr>
+          <p:cNvPr id="28" name="Rectangle 27"/>
+          <p:cNvSpPr/>
+          <p:nvPr/>
+        </p:nvSpPr>
+        <p:spPr>
+          <a:xfrm flipV="1">
+            <a:off x="2711546" y="4355381"/>
+            <a:ext cx="1066800" cy="45719"/>
+          </a:xfrm>
+          <a:prstGeom prst="rect">
+            <a:avLst/>
+          </a:prstGeom>
+          <a:solidFill>
+            <a:schemeClr val="bg1">
+              <a:lumMod val="75000"/>
+            </a:schemeClr>
+          </a:solidFill>
+          <a:ln>
+            <a:solidFill>
+              <a:schemeClr val="bg1">
+                <a:lumMod val="65000"/>
+              </a:schemeClr>
+            </a:solidFill>
+          </a:ln>
+        </p:spPr>
+        <p:style>
+          <a:lnRef idx="2">
+            <a:schemeClr val="accent1">
+              <a:shade val="50000"/>
+            </a:schemeClr>
+          </a:lnRef>
+          <a:fillRef idx="1">
+            <a:schemeClr val="accent1"/>
+          </a:fillRef>
+          <a:effectRef idx="0">
+            <a:schemeClr val="accent1"/>
+          </a:effectRef>
+          <a:fontRef idx="minor">
+            <a:schemeClr val="lt1"/>
+          </a:fontRef>
+        </p:style>
+        <p:txBody>
+          <a:bodyPr rtlCol="0" anchor="ctr"/>
+          <a:lstStyle/>
+          <a:p>
+            <a:pPr algn="ctr"/>
+            <a:endParaRPr lang="en-US"/>
+          </a:p>
+        </p:txBody>
+      </p:sp>
+      <p:sp>
+        <p:nvSpPr>
+          <p:cNvPr id="29" name="Rectangle 28"/>
+          <p:cNvSpPr/>
+          <p:nvPr/>
+        </p:nvSpPr>
+        <p:spPr>
+          <a:xfrm flipV="1">
+            <a:off x="4246432" y="4355381"/>
+            <a:ext cx="1066800" cy="45719"/>
+          </a:xfrm>
+          <a:prstGeom prst="rect">
+            <a:avLst/>
+          </a:prstGeom>
+          <a:solidFill>
+            <a:schemeClr val="bg1">
+              <a:lumMod val="75000"/>
+            </a:schemeClr>
+          </a:solidFill>
+          <a:ln>
+            <a:solidFill>
+              <a:schemeClr val="bg1">
+                <a:lumMod val="65000"/>
+              </a:schemeClr>
+            </a:solidFill>
+          </a:ln>
+        </p:spPr>
+        <p:style>
+          <a:lnRef idx="2">
+            <a:schemeClr val="accent1">
+              <a:shade val="50000"/>
+            </a:schemeClr>
+          </a:lnRef>
+          <a:fillRef idx="1">
+            <a:schemeClr val="accent1"/>
+          </a:fillRef>
+          <a:effectRef idx="0">
+            <a:schemeClr val="accent1"/>
+          </a:effectRef>
+          <a:fontRef idx="minor">
+            <a:schemeClr val="lt1"/>
+          </a:fontRef>
+        </p:style>
+        <p:txBody>
+          <a:bodyPr rtlCol="0" anchor="ctr"/>
+          <a:lstStyle/>
+          <a:p>
+            <a:pPr algn="ctr"/>
+            <a:endParaRPr lang="en-US"/>
+          </a:p>
+        </p:txBody>
+      </p:sp>
+      <p:sp>
+        <p:nvSpPr>
+          <p:cNvPr id="30" name="Rectangle 29"/>
+          <p:cNvSpPr/>
+          <p:nvPr/>
+        </p:nvSpPr>
+        <p:spPr>
+          <a:xfrm flipV="1">
+            <a:off x="2711546" y="4469680"/>
+            <a:ext cx="2601686" cy="45719"/>
+          </a:xfrm>
+          <a:prstGeom prst="rect">
+            <a:avLst/>
+          </a:prstGeom>
+          <a:solidFill>
+            <a:schemeClr val="bg1">
+              <a:lumMod val="75000"/>
+            </a:schemeClr>
+          </a:solidFill>
+          <a:ln>
+            <a:solidFill>
+              <a:schemeClr val="bg1">
+                <a:lumMod val="65000"/>
+              </a:schemeClr>
+            </a:solidFill>
+          </a:ln>
+        </p:spPr>
+        <p:style>
+          <a:lnRef idx="2">
+            <a:schemeClr val="accent1">
+              <a:shade val="50000"/>
+            </a:schemeClr>
+          </a:lnRef>
+          <a:fillRef idx="1">
+            <a:schemeClr val="accent1"/>
+          </a:fillRef>
+          <a:effectRef idx="0">
+            <a:schemeClr val="accent1"/>
+          </a:effectRef>
+          <a:fontRef idx="minor">
+            <a:schemeClr val="lt1"/>
+          </a:fontRef>
+        </p:style>
+        <p:txBody>
+          <a:bodyPr rtlCol="0" anchor="ctr"/>
+          <a:lstStyle/>
+          <a:p>
+            <a:pPr algn="ctr"/>
+            <a:endParaRPr lang="en-US"/>
+          </a:p>
+        </p:txBody>
+      </p:sp>
+      <p:sp>
+        <p:nvSpPr>
+          <p:cNvPr id="32" name="Rectangle 31"/>
+          <p:cNvSpPr/>
+          <p:nvPr/>
+        </p:nvSpPr>
+        <p:spPr>
+          <a:xfrm>
+            <a:off x="2707171" y="1358270"/>
+            <a:ext cx="2610437" cy="978632"/>
+          </a:xfrm>
+          <a:prstGeom prst="rect">
+            <a:avLst/>
+          </a:prstGeom>
+          <a:solidFill>
+            <a:schemeClr val="bg1">
+              <a:lumMod val="65000"/>
+            </a:schemeClr>
+          </a:solidFill>
+          <a:ln>
+            <a:solidFill>
+              <a:schemeClr val="bg1">
+                <a:lumMod val="50000"/>
+              </a:schemeClr>
+            </a:solidFill>
+          </a:ln>
+        </p:spPr>
+        <p:style>
+          <a:lnRef idx="2">
+            <a:schemeClr val="accent1">
+              <a:shade val="50000"/>
+            </a:schemeClr>
+          </a:lnRef>
+          <a:fillRef idx="1">
+            <a:schemeClr val="accent1"/>
+          </a:fillRef>
+          <a:effectRef idx="0">
+            <a:schemeClr val="accent1"/>
+          </a:effectRef>
+          <a:fontRef idx="minor">
+            <a:schemeClr val="lt1"/>
+          </a:fontRef>
+        </p:style>
+        <p:txBody>
+          <a:bodyPr rtlCol="0" anchor="ctr"/>
+          <a:lstStyle/>
+          <a:p>
+            <a:pPr algn="ctr"/>
+            <a:endParaRPr lang="en-US"/>
+          </a:p>
+        </p:txBody>
+      </p:sp>
+      <p:sp>
+        <p:nvSpPr>
+          <p:cNvPr id="33" name="Rectangle 32"/>
+          <p:cNvSpPr/>
+          <p:nvPr/>
+        </p:nvSpPr>
+        <p:spPr>
+          <a:xfrm>
+            <a:off x="2707170" y="4601532"/>
+            <a:ext cx="2610437" cy="1055098"/>
+          </a:xfrm>
+          <a:prstGeom prst="rect">
+            <a:avLst/>
+          </a:prstGeom>
+          <a:solidFill>
+            <a:schemeClr val="bg1">
+              <a:lumMod val="65000"/>
+            </a:schemeClr>
+          </a:solidFill>
+          <a:ln>
+            <a:solidFill>
+              <a:schemeClr val="bg1">
+                <a:lumMod val="50000"/>
+              </a:schemeClr>
+            </a:solidFill>
+          </a:ln>
+        </p:spPr>
+        <p:style>
+          <a:lnRef idx="2">
+            <a:schemeClr val="accent1">
+              <a:shade val="50000"/>
+            </a:schemeClr>
+          </a:lnRef>
+          <a:fillRef idx="1">
+            <a:schemeClr val="accent1"/>
+          </a:fillRef>
+          <a:effectRef idx="0">
+            <a:schemeClr val="accent1"/>
+          </a:effectRef>
+          <a:fontRef idx="minor">
+            <a:schemeClr val="lt1"/>
+          </a:fontRef>
+        </p:style>
+        <p:txBody>
+          <a:bodyPr rtlCol="0" anchor="ctr"/>
+          <a:lstStyle/>
+          <a:p>
+            <a:pPr algn="ctr"/>
+            <a:endParaRPr lang="en-US"/>
+          </a:p>
+        </p:txBody>
+      </p:sp>
+      <p:sp>
+        <p:nvSpPr>
+          <p:cNvPr id="34" name="Oval 33"/>
+          <p:cNvSpPr/>
+          <p:nvPr/>
+        </p:nvSpPr>
+        <p:spPr>
+          <a:xfrm>
+            <a:off x="2445977" y="1152524"/>
+            <a:ext cx="3056709" cy="152400"/>
+          </a:xfrm>
+          <a:prstGeom prst="ellipse">
+            <a:avLst/>
+          </a:prstGeom>
+          <a:noFill/>
+          <a:ln>
+            <a:solidFill>
+              <a:schemeClr val="accent6">
+                <a:lumMod val="75000"/>
+              </a:schemeClr>
+            </a:solidFill>
+          </a:ln>
+        </p:spPr>
+        <p:style>
+          <a:lnRef idx="2">
+            <a:schemeClr val="accent1">
+              <a:shade val="50000"/>
+            </a:schemeClr>
+          </a:lnRef>
+          <a:fillRef idx="1">
+            <a:schemeClr val="accent1"/>
+          </a:fillRef>
+          <a:effectRef idx="0">
+            <a:schemeClr val="accent1"/>
+          </a:effectRef>
+          <a:fontRef idx="minor">
+            <a:schemeClr val="lt1"/>
+          </a:fontRef>
+        </p:style>
+        <p:txBody>
+          <a:bodyPr rtlCol="0" anchor="ctr"/>
+          <a:lstStyle/>
+          <a:p>
+            <a:pPr algn="ctr"/>
+            <a:endParaRPr lang="en-US"/>
+          </a:p>
+        </p:txBody>
+      </p:sp>
+      <p:sp>
+        <p:nvSpPr>
+          <p:cNvPr id="35" name="Oval 34"/>
+          <p:cNvSpPr/>
+          <p:nvPr/>
+        </p:nvSpPr>
+        <p:spPr>
+          <a:xfrm>
+            <a:off x="2445981" y="1201516"/>
+            <a:ext cx="3056709" cy="152400"/>
+          </a:xfrm>
+          <a:prstGeom prst="ellipse">
+            <a:avLst/>
+          </a:prstGeom>
+          <a:noFill/>
+          <a:ln>
+            <a:solidFill>
+              <a:schemeClr val="accent6">
+                <a:lumMod val="75000"/>
+              </a:schemeClr>
+            </a:solidFill>
+          </a:ln>
+        </p:spPr>
+        <p:style>
+          <a:lnRef idx="2">
+            <a:schemeClr val="accent1">
+              <a:shade val="50000"/>
+            </a:schemeClr>
+          </a:lnRef>
+          <a:fillRef idx="1">
+            <a:schemeClr val="accent1"/>
+          </a:fillRef>
+          <a:effectRef idx="0">
+            <a:schemeClr val="accent1"/>
+          </a:effectRef>
+          <a:fontRef idx="minor">
+            <a:schemeClr val="lt1"/>
+          </a:fontRef>
+        </p:style>
+        <p:txBody>
+          <a:bodyPr rtlCol="0" anchor="ctr"/>
+          <a:lstStyle/>
+          <a:p>
+            <a:pPr algn="ctr"/>
+            <a:endParaRPr lang="en-US"/>
+          </a:p>
+        </p:txBody>
+      </p:sp>
+      <p:sp>
+        <p:nvSpPr>
+          <p:cNvPr id="36" name="Oval 35"/>
+          <p:cNvSpPr/>
+          <p:nvPr/>
+        </p:nvSpPr>
+        <p:spPr>
+          <a:xfrm>
+            <a:off x="2445978" y="1255937"/>
+            <a:ext cx="3056709" cy="152400"/>
+          </a:xfrm>
+          <a:prstGeom prst="ellipse">
+            <a:avLst/>
+          </a:prstGeom>
+          <a:noFill/>
+          <a:ln>
+            <a:solidFill>
+              <a:schemeClr val="accent6">
+                <a:lumMod val="75000"/>
+              </a:schemeClr>
+            </a:solidFill>
+          </a:ln>
+        </p:spPr>
+        <p:style>
+          <a:lnRef idx="2">
+            <a:schemeClr val="accent1">
+              <a:shade val="50000"/>
+            </a:schemeClr>
+          </a:lnRef>
+          <a:fillRef idx="1">
+            <a:schemeClr val="accent1"/>
+          </a:fillRef>
+          <a:effectRef idx="0">
+            <a:schemeClr val="accent1"/>
+          </a:effectRef>
+          <a:fontRef idx="minor">
+            <a:schemeClr val="lt1"/>
+          </a:fontRef>
+        </p:style>
+        <p:txBody>
+          <a:bodyPr rtlCol="0" anchor="ctr"/>
+          <a:lstStyle/>
+          <a:p>
+            <a:pPr algn="ctr"/>
+            <a:endParaRPr lang="en-US"/>
+          </a:p>
+        </p:txBody>
+      </p:sp>
+      <p:sp>
+        <p:nvSpPr>
+          <p:cNvPr id="37" name="Oval 36"/>
+          <p:cNvSpPr/>
+          <p:nvPr/>
+        </p:nvSpPr>
+        <p:spPr>
+          <a:xfrm>
+            <a:off x="2445976" y="1087202"/>
+            <a:ext cx="3056709" cy="152400"/>
+          </a:xfrm>
+          <a:prstGeom prst="ellipse">
+            <a:avLst/>
+          </a:prstGeom>
+          <a:noFill/>
+          <a:ln>
+            <a:solidFill>
+              <a:schemeClr val="accent6">
+                <a:lumMod val="75000"/>
+              </a:schemeClr>
+            </a:solidFill>
+          </a:ln>
+        </p:spPr>
+        <p:style>
+          <a:lnRef idx="2">
+            <a:schemeClr val="accent1">
+              <a:shade val="50000"/>
+            </a:schemeClr>
+          </a:lnRef>
+          <a:fillRef idx="1">
+            <a:schemeClr val="accent1"/>
+          </a:fillRef>
+          <a:effectRef idx="0">
+            <a:schemeClr val="accent1"/>
+          </a:effectRef>
+          <a:fontRef idx="minor">
+            <a:schemeClr val="lt1"/>
+          </a:fontRef>
+        </p:style>
+        <p:txBody>
+          <a:bodyPr rtlCol="0" anchor="ctr"/>
+          <a:lstStyle/>
+          <a:p>
+            <a:pPr algn="ctr"/>
+            <a:endParaRPr lang="en-US"/>
+          </a:p>
+        </p:txBody>
+      </p:sp>
+      <p:sp>
+        <p:nvSpPr>
+          <p:cNvPr id="38" name="Oval 37"/>
+          <p:cNvSpPr/>
+          <p:nvPr/>
+        </p:nvSpPr>
+        <p:spPr>
+          <a:xfrm>
+            <a:off x="2445981" y="5656630"/>
+            <a:ext cx="3056709" cy="152400"/>
+          </a:xfrm>
+          <a:prstGeom prst="ellipse">
+            <a:avLst/>
+          </a:prstGeom>
+          <a:noFill/>
+          <a:ln>
+            <a:solidFill>
+              <a:schemeClr val="accent6">
+                <a:lumMod val="75000"/>
+              </a:schemeClr>
+            </a:solidFill>
+          </a:ln>
+        </p:spPr>
+        <p:style>
+          <a:lnRef idx="2">
+            <a:schemeClr val="accent1">
+              <a:shade val="50000"/>
+            </a:schemeClr>
+          </a:lnRef>
+          <a:fillRef idx="1">
+            <a:schemeClr val="accent1"/>
+          </a:fillRef>
+          <a:effectRef idx="0">
+            <a:schemeClr val="accent1"/>
+          </a:effectRef>
+          <a:fontRef idx="minor">
+            <a:schemeClr val="lt1"/>
+          </a:fontRef>
+        </p:style>
+        <p:txBody>
+          <a:bodyPr rtlCol="0" anchor="ctr"/>
+          <a:lstStyle/>
+          <a:p>
+            <a:pPr algn="ctr"/>
+            <a:endParaRPr lang="en-US"/>
+          </a:p>
+        </p:txBody>
+      </p:sp>
+      <p:sp>
+        <p:nvSpPr>
+          <p:cNvPr id="39" name="Oval 38"/>
+          <p:cNvSpPr/>
+          <p:nvPr/>
+        </p:nvSpPr>
+        <p:spPr>
+          <a:xfrm>
+            <a:off x="2445985" y="5705622"/>
+            <a:ext cx="3056709" cy="152400"/>
+          </a:xfrm>
+          <a:prstGeom prst="ellipse">
+            <a:avLst/>
+          </a:prstGeom>
+          <a:noFill/>
+          <a:ln>
+            <a:solidFill>
+              <a:schemeClr val="accent6">
+                <a:lumMod val="75000"/>
+              </a:schemeClr>
+            </a:solidFill>
+          </a:ln>
+        </p:spPr>
+        <p:style>
+          <a:lnRef idx="2">
+            <a:schemeClr val="accent1">
+              <a:shade val="50000"/>
+            </a:schemeClr>
+          </a:lnRef>
+          <a:fillRef idx="1">
+            <a:schemeClr val="accent1"/>
+          </a:fillRef>
+          <a:effectRef idx="0">
+            <a:schemeClr val="accent1"/>
+          </a:effectRef>
+          <a:fontRef idx="minor">
+            <a:schemeClr val="lt1"/>
+          </a:fontRef>
+        </p:style>
+        <p:txBody>
+          <a:bodyPr rtlCol="0" anchor="ctr"/>
+          <a:lstStyle/>
+          <a:p>
+            <a:pPr algn="ctr"/>
+            <a:endParaRPr lang="en-US"/>
+          </a:p>
+        </p:txBody>
+      </p:sp>
+      <p:sp>
+        <p:nvSpPr>
+          <p:cNvPr id="40" name="Oval 39"/>
+          <p:cNvSpPr/>
+          <p:nvPr/>
+        </p:nvSpPr>
+        <p:spPr>
+          <a:xfrm>
+            <a:off x="2445982" y="5760043"/>
+            <a:ext cx="3056709" cy="152400"/>
+          </a:xfrm>
+          <a:prstGeom prst="ellipse">
+            <a:avLst/>
+          </a:prstGeom>
+          <a:noFill/>
+          <a:ln>
+            <a:solidFill>
+              <a:schemeClr val="accent6">
+                <a:lumMod val="75000"/>
+              </a:schemeClr>
+            </a:solidFill>
+          </a:ln>
+        </p:spPr>
+        <p:style>
+          <a:lnRef idx="2">
+            <a:schemeClr val="accent1">
+              <a:shade val="50000"/>
+            </a:schemeClr>
+          </a:lnRef>
+          <a:fillRef idx="1">
+            <a:schemeClr val="accent1"/>
+          </a:fillRef>
+          <a:effectRef idx="0">
+            <a:schemeClr val="accent1"/>
+          </a:effectRef>
+          <a:fontRef idx="minor">
+            <a:schemeClr val="lt1"/>
+          </a:fontRef>
+        </p:style>
+        <p:txBody>
+          <a:bodyPr rtlCol="0" anchor="ctr"/>
+          <a:lstStyle/>
+          <a:p>
+            <a:pPr algn="ctr"/>
+            <a:endParaRPr lang="en-US"/>
+          </a:p>
+        </p:txBody>
+      </p:sp>
+      <p:sp>
+        <p:nvSpPr>
+          <p:cNvPr id="41" name="Oval 40"/>
+          <p:cNvSpPr/>
+          <p:nvPr/>
+        </p:nvSpPr>
+        <p:spPr>
+          <a:xfrm>
+            <a:off x="2445980" y="5591308"/>
+            <a:ext cx="3056709" cy="152400"/>
+          </a:xfrm>
+          <a:prstGeom prst="ellipse">
+            <a:avLst/>
+          </a:prstGeom>
+          <a:noFill/>
+          <a:ln>
+            <a:solidFill>
+              <a:schemeClr val="accent6">
+                <a:lumMod val="75000"/>
+              </a:schemeClr>
+            </a:solidFill>
+          </a:ln>
+        </p:spPr>
+        <p:style>
+          <a:lnRef idx="2">
+            <a:schemeClr val="accent1">
+              <a:shade val="50000"/>
+            </a:schemeClr>
+          </a:lnRef>
+          <a:fillRef idx="1">
+            <a:schemeClr val="accent1"/>
+          </a:fillRef>
+          <a:effectRef idx="0">
+            <a:schemeClr val="accent1"/>
+          </a:effectRef>
+          <a:fontRef idx="minor">
+            <a:schemeClr val="lt1"/>
+          </a:fontRef>
+        </p:style>
+        <p:txBody>
+          <a:bodyPr rtlCol="0" anchor="ctr"/>
+          <a:lstStyle/>
+          <a:p>
+            <a:pPr algn="ctr"/>
+            <a:endParaRPr lang="en-US"/>
+          </a:p>
+        </p:txBody>
+      </p:sp>
+      <p:sp>
+        <p:nvSpPr>
+          <p:cNvPr id="42" name="TextBox 41"/>
+          <p:cNvSpPr txBox="1"/>
+          <p:nvPr/>
+        </p:nvSpPr>
+        <p:spPr>
+          <a:xfrm>
+            <a:off x="3782723" y="1629016"/>
+            <a:ext cx="522900" cy="707886"/>
+          </a:xfrm>
+          <a:prstGeom prst="rect">
+            <a:avLst/>
+          </a:prstGeom>
+          <a:noFill/>
+        </p:spPr>
+        <p:txBody>
+          <a:bodyPr wrap="none" rtlCol="0">
+            <a:spAutoFit/>
+          </a:bodyPr>
+          <a:lstStyle/>
+          <a:p>
+            <a:r>
+              <a:rPr lang="en-US" sz="4000" b="1" dirty="0" smtClean="0">
+                <a:solidFill>
+                  <a:srgbClr val="0000CC"/>
+                </a:solidFill>
+              </a:rPr>
+              <a:t>N</a:t>
+            </a:r>
+            <a:endParaRPr lang="en-US" sz="4000" b="1" dirty="0">
+              <a:solidFill>
+                <a:srgbClr val="0000CC"/>
+              </a:solidFill>
+            </a:endParaRPr>
+          </a:p>
+        </p:txBody>
+      </p:sp>
+      <p:sp>
+        <p:nvSpPr>
+          <p:cNvPr id="43" name="TextBox 42"/>
+          <p:cNvSpPr txBox="1"/>
+          <p:nvPr/>
+        </p:nvSpPr>
+        <p:spPr>
+          <a:xfrm>
+            <a:off x="3778346" y="4606533"/>
+            <a:ext cx="426720" cy="707886"/>
+          </a:xfrm>
+          <a:prstGeom prst="rect">
+            <a:avLst/>
+          </a:prstGeom>
+          <a:noFill/>
+        </p:spPr>
+        <p:txBody>
+          <a:bodyPr wrap="none" rtlCol="0">
+            <a:spAutoFit/>
+          </a:bodyPr>
+          <a:lstStyle/>
+          <a:p>
+            <a:r>
+              <a:rPr lang="en-US" sz="4000" b="1" dirty="0">
+                <a:solidFill>
+                  <a:srgbClr val="0000CC"/>
+                </a:solidFill>
+              </a:rPr>
+              <a:t>S</a:t>
+            </a:r>
+          </a:p>
+        </p:txBody>
+      </p:sp>
+      <p:sp>
+        <p:nvSpPr>
+          <p:cNvPr id="44" name="TextBox 43"/>
+          <p:cNvSpPr txBox="1"/>
+          <p:nvPr/>
+        </p:nvSpPr>
+        <p:spPr>
+          <a:xfrm>
+            <a:off x="4945437" y="3104401"/>
+            <a:ext cx="439544" cy="707886"/>
+          </a:xfrm>
+          <a:prstGeom prst="rect">
+            <a:avLst/>
+          </a:prstGeom>
+          <a:noFill/>
+        </p:spPr>
+        <p:txBody>
+          <a:bodyPr wrap="none" rtlCol="0">
+            <a:spAutoFit/>
+          </a:bodyPr>
+          <a:lstStyle/>
+          <a:p>
+            <a:r>
+              <a:rPr lang="en-US" sz="4000" b="1" dirty="0">
+                <a:solidFill>
+                  <a:srgbClr val="FF0000"/>
+                </a:solidFill>
+              </a:rPr>
+              <a:t>+</a:t>
+            </a:r>
+          </a:p>
+        </p:txBody>
+      </p:sp>
+      <p:sp>
+        <p:nvSpPr>
+          <p:cNvPr id="45" name="TextBox 44"/>
+          <p:cNvSpPr txBox="1"/>
+          <p:nvPr/>
+        </p:nvSpPr>
+        <p:spPr>
+          <a:xfrm>
+            <a:off x="2678963" y="3125137"/>
+            <a:ext cx="341760" cy="707886"/>
+          </a:xfrm>
+          <a:prstGeom prst="rect">
+            <a:avLst/>
+          </a:prstGeom>
+          <a:noFill/>
+        </p:spPr>
+        <p:txBody>
+          <a:bodyPr wrap="none" rtlCol="0">
+            <a:spAutoFit/>
+          </a:bodyPr>
+          <a:lstStyle/>
+          <a:p>
+            <a:r>
+              <a:rPr lang="en-US" sz="4000" b="1" dirty="0" smtClean="0">
+                <a:solidFill>
+                  <a:srgbClr val="FF0000"/>
+                </a:solidFill>
+              </a:rPr>
+              <a:t>-</a:t>
+            </a:r>
+            <a:endParaRPr lang="en-US" sz="4000" b="1" dirty="0">
+              <a:solidFill>
+                <a:srgbClr val="FF0000"/>
+              </a:solidFill>
+            </a:endParaRPr>
+          </a:p>
+        </p:txBody>
+      </p:sp>
+      <p:sp>
+        <p:nvSpPr>
+          <p:cNvPr id="46" name="Flowchart: Summing Junction 45"/>
+          <p:cNvSpPr/>
+          <p:nvPr/>
+        </p:nvSpPr>
+        <p:spPr>
+          <a:xfrm>
+            <a:off x="3950863" y="3417555"/>
+            <a:ext cx="123049" cy="123049"/>
+          </a:xfrm>
+          <a:prstGeom prst="flowChartSummingJunction">
+            <a:avLst/>
+          </a:prstGeom>
+          <a:noFill/>
+        </p:spPr>
+        <p:style>
+          <a:lnRef idx="2">
+            <a:schemeClr val="accent1">
+              <a:shade val="50000"/>
+            </a:schemeClr>
+          </a:lnRef>
+          <a:fillRef idx="1">
+            <a:schemeClr val="accent1"/>
+          </a:fillRef>
+          <a:effectRef idx="0">
+            <a:schemeClr val="accent1"/>
+          </a:effectRef>
+          <a:fontRef idx="minor">
+            <a:schemeClr val="lt1"/>
+          </a:fontRef>
+        </p:style>
+        <p:txBody>
+          <a:bodyPr rtlCol="0" anchor="ctr"/>
+          <a:lstStyle/>
+          <a:p>
+            <a:pPr algn="ctr"/>
+            <a:endParaRPr lang="en-US"/>
+          </a:p>
+        </p:txBody>
+      </p:sp>
+      <p:sp>
+        <p:nvSpPr>
+          <p:cNvPr id="47" name="TextBox 46"/>
+          <p:cNvSpPr txBox="1"/>
+          <p:nvPr/>
+        </p:nvSpPr>
+        <p:spPr>
+          <a:xfrm>
+            <a:off x="-343972" y="3217438"/>
+            <a:ext cx="1972484" cy="646331"/>
+          </a:xfrm>
+          <a:prstGeom prst="rect">
+            <a:avLst/>
+          </a:prstGeom>
+          <a:noFill/>
+        </p:spPr>
+        <p:txBody>
+          <a:bodyPr wrap="square" rtlCol="0">
+            <a:spAutoFit/>
+          </a:bodyPr>
+          <a:lstStyle/>
+          <a:p>
+            <a:r>
+              <a:rPr lang="en-US" i="1" dirty="0" smtClean="0"/>
+              <a:t>Electrode “shims” for shaping E-field</a:t>
+            </a:r>
+          </a:p>
+        </p:txBody>
+      </p:sp>
+      <p:cxnSp>
+        <p:nvCxnSpPr>
+          <p:cNvPr id="49" name="Straight Arrow Connector 48"/>
+          <p:cNvCxnSpPr/>
+          <p:nvPr/>
+        </p:nvCxnSpPr>
+        <p:spPr>
+          <a:xfrm flipV="1">
+            <a:off x="1180019" y="2701839"/>
+            <a:ext cx="609600" cy="515599"/>
+          </a:xfrm>
+          <a:prstGeom prst="straightConnector1">
+            <a:avLst/>
+          </a:prstGeom>
+          <a:ln w="28575">
+            <a:solidFill>
+              <a:schemeClr val="tx1"/>
+            </a:solidFill>
+            <a:tailEnd type="arrow"/>
+          </a:ln>
+        </p:spPr>
+        <p:style>
+          <a:lnRef idx="1">
+            <a:schemeClr val="accent1"/>
+          </a:lnRef>
+          <a:fillRef idx="0">
+            <a:schemeClr val="accent1"/>
+          </a:fillRef>
+          <a:effectRef idx="0">
+            <a:schemeClr val="accent1"/>
+          </a:effectRef>
+          <a:fontRef idx="minor">
+            <a:schemeClr val="tx1"/>
+          </a:fontRef>
+        </p:style>
+      </p:cxnSp>
+      <p:cxnSp>
+        <p:nvCxnSpPr>
+          <p:cNvPr id="50" name="Straight Arrow Connector 49"/>
+          <p:cNvCxnSpPr/>
+          <p:nvPr/>
+        </p:nvCxnSpPr>
+        <p:spPr>
+          <a:xfrm>
+            <a:off x="1219200" y="3946712"/>
+            <a:ext cx="609600" cy="408669"/>
+          </a:xfrm>
+          <a:prstGeom prst="straightConnector1">
+            <a:avLst/>
+          </a:prstGeom>
+          <a:ln w="28575">
+            <a:solidFill>
+              <a:schemeClr val="tx1"/>
+            </a:solidFill>
+            <a:tailEnd type="arrow"/>
+          </a:ln>
+        </p:spPr>
+        <p:style>
+          <a:lnRef idx="1">
+            <a:schemeClr val="accent1"/>
+          </a:lnRef>
+          <a:fillRef idx="0">
+            <a:schemeClr val="accent1"/>
+          </a:fillRef>
+          <a:effectRef idx="0">
+            <a:schemeClr val="accent1"/>
+          </a:effectRef>
+          <a:fontRef idx="minor">
+            <a:schemeClr val="tx1"/>
+          </a:fontRef>
+        </p:style>
+      </p:cxnSp>
+      <p:sp>
+        <p:nvSpPr>
+          <p:cNvPr id="52" name="TextBox 51"/>
+          <p:cNvSpPr txBox="1"/>
+          <p:nvPr/>
+        </p:nvSpPr>
+        <p:spPr>
+          <a:xfrm>
+            <a:off x="5980783" y="2556870"/>
+            <a:ext cx="3620417" cy="1846659"/>
+          </a:xfrm>
+          <a:prstGeom prst="rect">
+            <a:avLst/>
+          </a:prstGeom>
+          <a:noFill/>
+          <a:ln w="19050">
+            <a:solidFill>
+              <a:schemeClr val="tx1"/>
+            </a:solidFill>
+          </a:ln>
+        </p:spPr>
+        <p:txBody>
+          <a:bodyPr wrap="square" rtlCol="0">
+            <a:spAutoFit/>
+          </a:bodyPr>
+          <a:lstStyle/>
+          <a:p>
+            <a:pPr algn="ctr"/>
+            <a:r>
+              <a:rPr lang="en-US" dirty="0" smtClean="0">
+                <a:solidFill>
+                  <a:srgbClr val="000099"/>
+                </a:solidFill>
+              </a:rPr>
+              <a:t>Only ions with velocity satisfying</a:t>
+            </a:r>
+          </a:p>
+          <a:p>
+            <a:pPr algn="ctr"/>
+            <a:r>
+              <a:rPr lang="en-US" sz="2400" b="1" i="1" dirty="0" err="1" smtClean="0"/>
+              <a:t>qE</a:t>
+            </a:r>
+            <a:r>
+              <a:rPr lang="en-US" sz="2400" b="1" i="1" dirty="0" smtClean="0"/>
+              <a:t> = </a:t>
+            </a:r>
+            <a:r>
+              <a:rPr lang="en-US" sz="2400" b="1" i="1" dirty="0" err="1" smtClean="0"/>
+              <a:t>qvB</a:t>
+            </a:r>
+            <a:endParaRPr lang="en-US" sz="2400" b="1" i="1" dirty="0" smtClean="0"/>
+          </a:p>
+          <a:p>
+            <a:pPr algn="ctr"/>
+            <a:r>
+              <a:rPr lang="en-US" dirty="0" smtClean="0">
+                <a:solidFill>
+                  <a:srgbClr val="000099"/>
+                </a:solidFill>
+              </a:rPr>
+              <a:t>will move through filter undeflected, thus selecting specific </a:t>
+            </a:r>
+            <a:r>
+              <a:rPr lang="en-US" b="1" i="1" dirty="0" smtClean="0"/>
+              <a:t>m/q</a:t>
+            </a:r>
+            <a:r>
+              <a:rPr lang="en-US" dirty="0" smtClean="0">
+                <a:solidFill>
+                  <a:srgbClr val="000099"/>
+                </a:solidFill>
+              </a:rPr>
+              <a:t>, which have different velocities due to initial acceleration.</a:t>
+            </a:r>
+            <a:endParaRPr lang="en-US" dirty="0">
+              <a:solidFill>
+                <a:srgbClr val="000099"/>
+              </a:solidFill>
+            </a:endParaRPr>
+          </a:p>
+        </p:txBody>
+      </p:sp>
+      <p:sp>
+        <p:nvSpPr>
+          <p:cNvPr id="54" name="TextBox 53"/>
+          <p:cNvSpPr txBox="1"/>
+          <p:nvPr/>
+        </p:nvSpPr>
+        <p:spPr>
+          <a:xfrm>
+            <a:off x="3530210" y="3032772"/>
+            <a:ext cx="1972484" cy="369332"/>
+          </a:xfrm>
+          <a:prstGeom prst="rect">
+            <a:avLst/>
+          </a:prstGeom>
+          <a:noFill/>
+        </p:spPr>
+        <p:txBody>
+          <a:bodyPr wrap="square" rtlCol="0">
+            <a:spAutoFit/>
+          </a:bodyPr>
+          <a:lstStyle/>
+          <a:p>
+            <a:r>
+              <a:rPr lang="en-US" i="1" dirty="0" smtClean="0"/>
+              <a:t>ion beam</a:t>
+            </a:r>
+          </a:p>
+        </p:txBody>
+      </p:sp>
+    </p:spTree>
+    <p:extLst>
+      <p:ext uri="{BB962C8B-B14F-4D97-AF65-F5344CB8AC3E}">
+        <p14:creationId xmlns:p14="http://schemas.microsoft.com/office/powerpoint/2010/main" val="3165224245"/>
       </p:ext>
     </p:extLst>
   </p:cSld>

</xml_diff>